<commit_message>
Added IA final submission TOC
</commit_message>
<xml_diff>
--- a/Sem 5/TOC/IA1/PPT_G6.pptx
+++ b/Sem 5/TOC/IA1/PPT_G6.pptx
@@ -19,28 +19,29 @@
     <p:sldId id="264" r:id="rId14"/>
     <p:sldId id="265" r:id="rId15"/>
     <p:sldId id="266" r:id="rId16"/>
+    <p:sldId id="267" r:id="rId17"/>
   </p:sldIdLst>
   <p:sldSz cy="5143500" cx="9144000"/>
   <p:notesSz cx="6858000" cy="9144000"/>
   <p:embeddedFontLst>
     <p:embeddedFont>
       <p:font typeface="Roboto"/>
-      <p:regular r:id="rId17"/>
-      <p:bold r:id="rId18"/>
-      <p:italic r:id="rId19"/>
-      <p:boldItalic r:id="rId20"/>
+      <p:regular r:id="rId18"/>
+      <p:bold r:id="rId19"/>
+      <p:italic r:id="rId20"/>
+      <p:boldItalic r:id="rId21"/>
     </p:embeddedFont>
     <p:embeddedFont>
       <p:font typeface="Nunito"/>
-      <p:regular r:id="rId21"/>
-      <p:bold r:id="rId22"/>
-      <p:italic r:id="rId23"/>
-      <p:boldItalic r:id="rId24"/>
+      <p:regular r:id="rId22"/>
+      <p:bold r:id="rId23"/>
+      <p:italic r:id="rId24"/>
+      <p:boldItalic r:id="rId25"/>
     </p:embeddedFont>
     <p:embeddedFont>
       <p:font typeface="Maven Pro"/>
-      <p:regular r:id="rId25"/>
-      <p:bold r:id="rId26"/>
+      <p:regular r:id="rId26"/>
+      <p:bold r:id="rId27"/>
     </p:embeddedFont>
   </p:embeddedFontLst>
   <p:defaultTextStyle>
@@ -821,7 +822,7 @@
   <p:cSld>
     <p:spTree>
       <p:nvGrpSpPr>
-        <p:cNvPr id="377" name="Shape 377"/>
+        <p:cNvPr id="386" name="Shape 386"/>
         <p:cNvGrpSpPr/>
         <p:nvPr/>
       </p:nvGrpSpPr>
@@ -835,7 +836,7 @@
       </p:grpSpPr>
       <p:sp>
         <p:nvSpPr>
-          <p:cNvPr id="378" name="Google Shape;378;gf923048ea8_5_10:notes"/>
+          <p:cNvPr id="387" name="Google Shape;387;gf923048ea8_5_5:notes"/>
           <p:cNvSpPr/>
           <p:nvPr>
             <p:ph idx="2" type="sldImg"/>
@@ -870,7 +871,7 @@
       </p:sp>
       <p:sp>
         <p:nvSpPr>
-          <p:cNvPr id="379" name="Google Shape;379;gf923048ea8_5_10:notes"/>
+          <p:cNvPr id="388" name="Google Shape;388;gf923048ea8_5_5:notes"/>
           <p:cNvSpPr txBox="1"/>
           <p:nvPr>
             <p:ph idx="1" type="body"/>
@@ -920,7 +921,7 @@
   <p:cSld>
     <p:spTree>
       <p:nvGrpSpPr>
-        <p:cNvPr id="383" name="Shape 383"/>
+        <p:cNvPr id="392" name="Shape 392"/>
         <p:cNvGrpSpPr/>
         <p:nvPr/>
       </p:nvGrpSpPr>
@@ -934,7 +935,7 @@
       </p:grpSpPr>
       <p:sp>
         <p:nvSpPr>
-          <p:cNvPr id="384" name="Google Shape;384;gf923048ea8_1_5:notes"/>
+          <p:cNvPr id="393" name="Google Shape;393;gf923048ea8_5_10:notes"/>
           <p:cNvSpPr/>
           <p:nvPr>
             <p:ph idx="2" type="sldImg"/>
@@ -969,7 +970,106 @@
       </p:sp>
       <p:sp>
         <p:nvSpPr>
-          <p:cNvPr id="385" name="Google Shape;385;gf923048ea8_1_5:notes"/>
+          <p:cNvPr id="394" name="Google Shape;394;gf923048ea8_5_10:notes"/>
+          <p:cNvSpPr txBox="1"/>
+          <p:nvPr>
+            <p:ph idx="1" type="body"/>
+          </p:nvPr>
+        </p:nvSpPr>
+        <p:spPr>
+          <a:xfrm>
+            <a:off x="685800" y="4343400"/>
+            <a:ext cx="5486400" cy="4114800"/>
+          </a:xfrm>
+          <a:prstGeom prst="rect">
+            <a:avLst/>
+          </a:prstGeom>
+        </p:spPr>
+        <p:txBody>
+          <a:bodyPr anchorCtr="0" anchor="t" bIns="91425" lIns="91425" spcFirstLastPara="1" rIns="91425" wrap="square" tIns="91425">
+            <a:noAutofit/>
+          </a:bodyPr>
+          <a:lstStyle/>
+          <a:p>
+            <a:pPr indent="0" lvl="0" marL="0" rtl="0" algn="l">
+              <a:spcBef>
+                <a:spcPts val="0"/>
+              </a:spcBef>
+              <a:spcAft>
+                <a:spcPts val="0"/>
+              </a:spcAft>
+              <a:buNone/>
+            </a:pPr>
+            <a:r>
+              <a:t/>
+            </a:r>
+            <a:endParaRPr/>
+          </a:p>
+        </p:txBody>
+      </p:sp>
+    </p:spTree>
+  </p:cSld>
+  <p:clrMapOvr>
+    <a:masterClrMapping/>
+  </p:clrMapOvr>
+</p:notes>
+</file>
+
+<file path=ppt/notesSlides/notesSlide12.xml><?xml version="1.0" encoding="utf-8"?>
+<p:notes xmlns:a="http://schemas.openxmlformats.org/drawingml/2006/main" xmlns:r="http://schemas.openxmlformats.org/officeDocument/2006/relationships" xmlns:mc="http://schemas.openxmlformats.org/markup-compatibility/2006" xmlns:mv="urn:schemas-microsoft-com:mac:vml" xmlns:p="http://schemas.openxmlformats.org/presentationml/2006/main" xmlns:c="http://schemas.openxmlformats.org/drawingml/2006/chart" xmlns:dgm="http://schemas.openxmlformats.org/drawingml/2006/diagram" xmlns:o="urn:schemas-microsoft-com:office:office" xmlns:v="urn:schemas-microsoft-com:vml" xmlns:pvml="urn:schemas-microsoft-com:office:powerpoint" xmlns:com="http://schemas.openxmlformats.org/drawingml/2006/compatibility" xmlns:p14="http://schemas.microsoft.com/office/powerpoint/2010/main" xmlns:p15="http://schemas.microsoft.com/office/powerpoint/2012/main" xmlns:ahyp="http://schemas.microsoft.com/office/drawing/2018/hyperlinkcolor" showMasterPhAnim="0" showMasterSp="0">
+  <p:cSld>
+    <p:spTree>
+      <p:nvGrpSpPr>
+        <p:cNvPr id="398" name="Shape 398"/>
+        <p:cNvGrpSpPr/>
+        <p:nvPr/>
+      </p:nvGrpSpPr>
+      <p:grpSpPr>
+        <a:xfrm>
+          <a:off x="0" y="0"/>
+          <a:ext cx="0" cy="0"/>
+          <a:chOff x="0" y="0"/>
+          <a:chExt cx="0" cy="0"/>
+        </a:xfrm>
+      </p:grpSpPr>
+      <p:sp>
+        <p:nvSpPr>
+          <p:cNvPr id="399" name="Google Shape;399;gf923048ea8_1_5:notes"/>
+          <p:cNvSpPr/>
+          <p:nvPr>
+            <p:ph idx="2" type="sldImg"/>
+          </p:nvPr>
+        </p:nvSpPr>
+        <p:spPr>
+          <a:xfrm>
+            <a:off x="381300" y="685800"/>
+            <a:ext cx="6096000" cy="3429000"/>
+          </a:xfrm>
+          <a:custGeom>
+            <a:rect b="b" l="l" r="r" t="t"/>
+            <a:pathLst>
+              <a:path extrusionOk="0" h="120000" w="120000">
+                <a:moveTo>
+                  <a:pt x="0" y="0"/>
+                </a:moveTo>
+                <a:lnTo>
+                  <a:pt x="120000" y="0"/>
+                </a:lnTo>
+                <a:lnTo>
+                  <a:pt x="120000" y="120000"/>
+                </a:lnTo>
+                <a:lnTo>
+                  <a:pt x="0" y="120000"/>
+                </a:lnTo>
+                <a:close/>
+              </a:path>
+            </a:pathLst>
+          </a:custGeom>
+        </p:spPr>
+      </p:sp>
+      <p:sp>
+        <p:nvSpPr>
+          <p:cNvPr id="400" name="Google Shape;400;gf923048ea8_1_5:notes"/>
           <p:cNvSpPr txBox="1"/>
           <p:nvPr>
             <p:ph idx="1" type="body"/>
@@ -1118,7 +1218,7 @@
   <p:cSld>
     <p:spTree>
       <p:nvGrpSpPr>
-        <p:cNvPr id="299" name="Shape 299"/>
+        <p:cNvPr id="300" name="Shape 300"/>
         <p:cNvGrpSpPr/>
         <p:nvPr/>
       </p:nvGrpSpPr>
@@ -1132,7 +1232,7 @@
       </p:grpSpPr>
       <p:sp>
         <p:nvSpPr>
-          <p:cNvPr id="300" name="Google Shape;300;gf923048ea8_6_64:notes"/>
+          <p:cNvPr id="301" name="Google Shape;301;gf923048ea8_6_64:notes"/>
           <p:cNvSpPr/>
           <p:nvPr>
             <p:ph idx="2" type="sldImg"/>
@@ -1167,7 +1267,7 @@
       </p:sp>
       <p:sp>
         <p:nvSpPr>
-          <p:cNvPr id="301" name="Google Shape;301;gf923048ea8_6_64:notes"/>
+          <p:cNvPr id="302" name="Google Shape;302;gf923048ea8_6_64:notes"/>
           <p:cNvSpPr txBox="1"/>
           <p:nvPr>
             <p:ph idx="1" type="body"/>
@@ -1217,7 +1317,7 @@
   <p:cSld>
     <p:spTree>
       <p:nvGrpSpPr>
-        <p:cNvPr id="320" name="Shape 320"/>
+        <p:cNvPr id="322" name="Shape 322"/>
         <p:cNvGrpSpPr/>
         <p:nvPr/>
       </p:nvGrpSpPr>
@@ -1231,7 +1331,7 @@
       </p:grpSpPr>
       <p:sp>
         <p:nvSpPr>
-          <p:cNvPr id="321" name="Google Shape;321;gf923048ea8_7_4:notes"/>
+          <p:cNvPr id="323" name="Google Shape;323;gf923048ea8_7_4:notes"/>
           <p:cNvSpPr/>
           <p:nvPr>
             <p:ph idx="2" type="sldImg"/>
@@ -1266,7 +1366,7 @@
       </p:sp>
       <p:sp>
         <p:nvSpPr>
-          <p:cNvPr id="322" name="Google Shape;322;gf923048ea8_7_4:notes"/>
+          <p:cNvPr id="324" name="Google Shape;324;gf923048ea8_7_4:notes"/>
           <p:cNvSpPr txBox="1"/>
           <p:nvPr>
             <p:ph idx="1" type="body"/>
@@ -1316,7 +1416,7 @@
   <p:cSld>
     <p:spTree>
       <p:nvGrpSpPr>
-        <p:cNvPr id="347" name="Shape 347"/>
+        <p:cNvPr id="350" name="Shape 350"/>
         <p:cNvGrpSpPr/>
         <p:nvPr/>
       </p:nvGrpSpPr>
@@ -1330,7 +1430,7 @@
       </p:grpSpPr>
       <p:sp>
         <p:nvSpPr>
-          <p:cNvPr id="348" name="Google Shape;348;gf923048ea8_5_0:notes"/>
+          <p:cNvPr id="351" name="Google Shape;351;gf923048ea8_5_0:notes"/>
           <p:cNvSpPr/>
           <p:nvPr>
             <p:ph idx="2" type="sldImg"/>
@@ -1365,7 +1465,7 @@
       </p:sp>
       <p:sp>
         <p:nvSpPr>
-          <p:cNvPr id="349" name="Google Shape;349;gf923048ea8_5_0:notes"/>
+          <p:cNvPr id="352" name="Google Shape;352;gf923048ea8_5_0:notes"/>
           <p:cNvSpPr txBox="1"/>
           <p:nvPr>
             <p:ph idx="1" type="body"/>
@@ -1415,7 +1515,7 @@
   <p:cSld>
     <p:spTree>
       <p:nvGrpSpPr>
-        <p:cNvPr id="353" name="Shape 353"/>
+        <p:cNvPr id="357" name="Shape 357"/>
         <p:cNvGrpSpPr/>
         <p:nvPr/>
       </p:nvGrpSpPr>
@@ -1429,7 +1529,7 @@
       </p:grpSpPr>
       <p:sp>
         <p:nvSpPr>
-          <p:cNvPr id="354" name="Google Shape;354;gf923048ea8_5_15:notes"/>
+          <p:cNvPr id="358" name="Google Shape;358;gfaa43a829c_0_10:notes"/>
           <p:cNvSpPr/>
           <p:nvPr>
             <p:ph idx="2" type="sldImg"/>
@@ -1464,7 +1564,7 @@
       </p:sp>
       <p:sp>
         <p:nvSpPr>
-          <p:cNvPr id="355" name="Google Shape;355;gf923048ea8_5_15:notes"/>
+          <p:cNvPr id="359" name="Google Shape;359;gfaa43a829c_0_10:notes"/>
           <p:cNvSpPr txBox="1"/>
           <p:nvPr>
             <p:ph idx="1" type="body"/>
@@ -1514,7 +1614,7 @@
   <p:cSld>
     <p:spTree>
       <p:nvGrpSpPr>
-        <p:cNvPr id="359" name="Shape 359"/>
+        <p:cNvPr id="363" name="Shape 363"/>
         <p:cNvGrpSpPr/>
         <p:nvPr/>
       </p:nvGrpSpPr>
@@ -1528,7 +1628,7 @@
       </p:grpSpPr>
       <p:sp>
         <p:nvSpPr>
-          <p:cNvPr id="360" name="Google Shape;360;gf932d9c008_0_0:notes"/>
+          <p:cNvPr id="364" name="Google Shape;364;gf923048ea8_5_15:notes"/>
           <p:cNvSpPr/>
           <p:nvPr>
             <p:ph idx="2" type="sldImg"/>
@@ -1563,7 +1663,7 @@
       </p:sp>
       <p:sp>
         <p:nvSpPr>
-          <p:cNvPr id="361" name="Google Shape;361;gf932d9c008_0_0:notes"/>
+          <p:cNvPr id="365" name="Google Shape;365;gf923048ea8_5_15:notes"/>
           <p:cNvSpPr txBox="1"/>
           <p:nvPr>
             <p:ph idx="1" type="body"/>
@@ -1613,7 +1713,7 @@
   <p:cSld>
     <p:spTree>
       <p:nvGrpSpPr>
-        <p:cNvPr id="365" name="Shape 365"/>
+        <p:cNvPr id="370" name="Shape 370"/>
         <p:cNvGrpSpPr/>
         <p:nvPr/>
       </p:nvGrpSpPr>
@@ -1627,7 +1727,7 @@
       </p:grpSpPr>
       <p:sp>
         <p:nvSpPr>
-          <p:cNvPr id="366" name="Google Shape;366;gf923048ea8_1_0:notes"/>
+          <p:cNvPr id="371" name="Google Shape;371;gf932d9c008_0_0:notes"/>
           <p:cNvSpPr/>
           <p:nvPr>
             <p:ph idx="2" type="sldImg"/>
@@ -1662,7 +1762,7 @@
       </p:sp>
       <p:sp>
         <p:nvSpPr>
-          <p:cNvPr id="367" name="Google Shape;367;gf923048ea8_1_0:notes"/>
+          <p:cNvPr id="372" name="Google Shape;372;gf932d9c008_0_0:notes"/>
           <p:cNvSpPr txBox="1"/>
           <p:nvPr>
             <p:ph idx="1" type="body"/>
@@ -1712,7 +1812,7 @@
   <p:cSld>
     <p:spTree>
       <p:nvGrpSpPr>
-        <p:cNvPr id="371" name="Shape 371"/>
+        <p:cNvPr id="378" name="Shape 378"/>
         <p:cNvGrpSpPr/>
         <p:nvPr/>
       </p:nvGrpSpPr>
@@ -1726,7 +1826,7 @@
       </p:grpSpPr>
       <p:sp>
         <p:nvSpPr>
-          <p:cNvPr id="372" name="Google Shape;372;gf923048ea8_5_5:notes"/>
+          <p:cNvPr id="379" name="Google Shape;379;gf923048ea8_1_0:notes"/>
           <p:cNvSpPr/>
           <p:nvPr>
             <p:ph idx="2" type="sldImg"/>
@@ -1761,7 +1861,7 @@
       </p:sp>
       <p:sp>
         <p:nvSpPr>
-          <p:cNvPr id="373" name="Google Shape;373;gf923048ea8_5_5:notes"/>
+          <p:cNvPr id="380" name="Google Shape;380;gf923048ea8_1_0:notes"/>
           <p:cNvSpPr txBox="1"/>
           <p:nvPr>
             <p:ph idx="1" type="body"/>
@@ -16247,7 +16347,7 @@
   <p:cSld>
     <p:spTree>
       <p:nvGrpSpPr>
-        <p:cNvPr id="380" name="Shape 380"/>
+        <p:cNvPr id="389" name="Shape 389"/>
         <p:cNvGrpSpPr/>
         <p:nvPr/>
       </p:nvGrpSpPr>
@@ -16261,7 +16361,7 @@
       </p:grpSpPr>
       <p:sp>
         <p:nvSpPr>
-          <p:cNvPr id="381" name="Google Shape;381;p22"/>
+          <p:cNvPr id="390" name="Google Shape;390;p22"/>
           <p:cNvSpPr txBox="1"/>
           <p:nvPr>
             <p:ph type="title"/>
@@ -16292,6 +16392,182 @@
               <a:buNone/>
             </a:pPr>
             <a:r>
+              <a:rPr lang="en" sz="4200"/>
+              <a:t>Conclusion</a:t>
+            </a:r>
+            <a:endParaRPr sz="4200"/>
+          </a:p>
+        </p:txBody>
+      </p:sp>
+      <p:sp>
+        <p:nvSpPr>
+          <p:cNvPr id="391" name="Google Shape;391;p22"/>
+          <p:cNvSpPr txBox="1"/>
+          <p:nvPr>
+            <p:ph idx="1" type="body"/>
+          </p:nvPr>
+        </p:nvSpPr>
+        <p:spPr>
+          <a:xfrm>
+            <a:off x="1303800" y="1946675"/>
+            <a:ext cx="7030500" cy="2541600"/>
+          </a:xfrm>
+          <a:prstGeom prst="rect">
+            <a:avLst/>
+          </a:prstGeom>
+        </p:spPr>
+        <p:txBody>
+          <a:bodyPr anchorCtr="0" anchor="t" bIns="91425" lIns="91425" spcFirstLastPara="1" rIns="91425" wrap="square" tIns="91425">
+            <a:normAutofit/>
+          </a:bodyPr>
+          <a:lstStyle/>
+          <a:p>
+            <a:pPr indent="0" lvl="0" marL="0" rtl="0" algn="l">
+              <a:spcBef>
+                <a:spcPts val="0"/>
+              </a:spcBef>
+              <a:spcAft>
+                <a:spcPts val="0"/>
+              </a:spcAft>
+              <a:buNone/>
+            </a:pPr>
+            <a:r>
+              <a:rPr lang="en"/>
+              <a:t>From the three research papers, we can conclude that we learnt about the halting problem in a flow. </a:t>
+            </a:r>
+            <a:endParaRPr/>
+          </a:p>
+          <a:p>
+            <a:pPr indent="-311150" lvl="0" marL="457200" rtl="0" algn="l">
+              <a:spcBef>
+                <a:spcPts val="1200"/>
+              </a:spcBef>
+              <a:spcAft>
+                <a:spcPts val="0"/>
+              </a:spcAft>
+              <a:buSzPts val="1300"/>
+              <a:buChar char="●"/>
+            </a:pPr>
+            <a:r>
+              <a:rPr lang="en"/>
+              <a:t>Firstly, we saw the history of halting problem and how the credit should go to Martin Davis for defining the halting problem.</a:t>
+            </a:r>
+            <a:endParaRPr/>
+          </a:p>
+          <a:p>
+            <a:pPr indent="-311150" lvl="0" marL="457200" rtl="0" algn="l">
+              <a:spcBef>
+                <a:spcPts val="0"/>
+              </a:spcBef>
+              <a:spcAft>
+                <a:spcPts val="0"/>
+              </a:spcAft>
+              <a:buSzPts val="1300"/>
+              <a:buChar char="●"/>
+            </a:pPr>
+            <a:r>
+              <a:rPr lang="en"/>
+              <a:t>Furthermore</a:t>
+            </a:r>
+            <a:r>
+              <a:rPr lang="en"/>
+              <a:t>, we studied about the problems faced in the halting problem that lead to the unsolvability and or </a:t>
+            </a:r>
+            <a:r>
+              <a:rPr lang="en"/>
+              <a:t>inconsistency</a:t>
+            </a:r>
+            <a:r>
+              <a:rPr lang="en"/>
+              <a:t> of the halting problem.</a:t>
+            </a:r>
+            <a:endParaRPr/>
+          </a:p>
+          <a:p>
+            <a:pPr indent="-311150" lvl="0" marL="457200" rtl="0" algn="l">
+              <a:spcBef>
+                <a:spcPts val="0"/>
+              </a:spcBef>
+              <a:spcAft>
+                <a:spcPts val="0"/>
+              </a:spcAft>
+              <a:buSzPts val="1300"/>
+              <a:buChar char="●"/>
+            </a:pPr>
+            <a:r>
+              <a:rPr lang="en"/>
+              <a:t>Finally, we learnt about the way to solve the problem just to realize that there is no </a:t>
+            </a:r>
+            <a:r>
+              <a:rPr lang="en"/>
+              <a:t>algorithm</a:t>
+            </a:r>
+            <a:r>
+              <a:rPr lang="en"/>
+              <a:t> that gives the exact solution. Hence, we studied different propositions and definitions to sharpen the approximations to the halting problem.</a:t>
+            </a:r>
+            <a:endParaRPr/>
+          </a:p>
+        </p:txBody>
+      </p:sp>
+    </p:spTree>
+  </p:cSld>
+  <p:clrMapOvr>
+    <a:masterClrMapping/>
+  </p:clrMapOvr>
+</p:sld>
+</file>
+
+<file path=ppt/slides/slide11.xml><?xml version="1.0" encoding="utf-8"?>
+<p:sld xmlns:a="http://schemas.openxmlformats.org/drawingml/2006/main" xmlns:r="http://schemas.openxmlformats.org/officeDocument/2006/relationships" xmlns:mc="http://schemas.openxmlformats.org/markup-compatibility/2006" xmlns:mv="urn:schemas-microsoft-com:mac:vml" xmlns:p="http://schemas.openxmlformats.org/presentationml/2006/main" xmlns:c="http://schemas.openxmlformats.org/drawingml/2006/chart" xmlns:dgm="http://schemas.openxmlformats.org/drawingml/2006/diagram" xmlns:o="urn:schemas-microsoft-com:office:office" xmlns:v="urn:schemas-microsoft-com:vml" xmlns:pvml="urn:schemas-microsoft-com:office:powerpoint" xmlns:com="http://schemas.openxmlformats.org/drawingml/2006/compatibility" xmlns:p14="http://schemas.microsoft.com/office/powerpoint/2010/main" xmlns:p15="http://schemas.microsoft.com/office/powerpoint/2012/main" xmlns:ahyp="http://schemas.microsoft.com/office/drawing/2018/hyperlinkcolor">
+  <p:cSld>
+    <p:spTree>
+      <p:nvGrpSpPr>
+        <p:cNvPr id="395" name="Shape 395"/>
+        <p:cNvGrpSpPr/>
+        <p:nvPr/>
+      </p:nvGrpSpPr>
+      <p:grpSpPr>
+        <a:xfrm>
+          <a:off x="0" y="0"/>
+          <a:ext cx="0" cy="0"/>
+          <a:chOff x="0" y="0"/>
+          <a:chExt cx="0" cy="0"/>
+        </a:xfrm>
+      </p:grpSpPr>
+      <p:sp>
+        <p:nvSpPr>
+          <p:cNvPr id="396" name="Google Shape;396;p23"/>
+          <p:cNvSpPr txBox="1"/>
+          <p:nvPr>
+            <p:ph type="title"/>
+          </p:nvPr>
+        </p:nvSpPr>
+        <p:spPr>
+          <a:xfrm>
+            <a:off x="1303800" y="598575"/>
+            <a:ext cx="7030500" cy="999300"/>
+          </a:xfrm>
+          <a:prstGeom prst="rect">
+            <a:avLst/>
+          </a:prstGeom>
+        </p:spPr>
+        <p:txBody>
+          <a:bodyPr anchorCtr="0" anchor="t" bIns="91425" lIns="91425" spcFirstLastPara="1" rIns="91425" wrap="square" tIns="91425">
+            <a:normAutofit/>
+          </a:bodyPr>
+          <a:lstStyle/>
+          <a:p>
+            <a:pPr indent="0" lvl="0" marL="0" rtl="0" algn="l">
+              <a:spcBef>
+                <a:spcPts val="0"/>
+              </a:spcBef>
+              <a:spcAft>
+                <a:spcPts val="0"/>
+              </a:spcAft>
+              <a:buNone/>
+            </a:pPr>
+            <a:r>
               <a:rPr lang="en" sz="4000"/>
               <a:t>References</a:t>
             </a:r>
@@ -16301,7 +16577,7 @@
       </p:sp>
       <p:sp>
         <p:nvSpPr>
-          <p:cNvPr id="382" name="Google Shape;382;p22"/>
+          <p:cNvPr id="397" name="Google Shape;397;p23"/>
           <p:cNvSpPr txBox="1"/>
           <p:nvPr>
             <p:ph idx="1" type="body"/>
@@ -16536,12 +16812,12 @@
 </p:sld>
 </file>
 
-<file path=ppt/slides/slide11.xml><?xml version="1.0" encoding="utf-8"?>
+<file path=ppt/slides/slide12.xml><?xml version="1.0" encoding="utf-8"?>
 <p:sld xmlns:a="http://schemas.openxmlformats.org/drawingml/2006/main" xmlns:r="http://schemas.openxmlformats.org/officeDocument/2006/relationships" xmlns:mc="http://schemas.openxmlformats.org/markup-compatibility/2006" xmlns:mv="urn:schemas-microsoft-com:mac:vml" xmlns:p="http://schemas.openxmlformats.org/presentationml/2006/main" xmlns:c="http://schemas.openxmlformats.org/drawingml/2006/chart" xmlns:dgm="http://schemas.openxmlformats.org/drawingml/2006/diagram" xmlns:o="urn:schemas-microsoft-com:office:office" xmlns:v="urn:schemas-microsoft-com:vml" xmlns:pvml="urn:schemas-microsoft-com:office:powerpoint" xmlns:com="http://schemas.openxmlformats.org/drawingml/2006/compatibility" xmlns:p14="http://schemas.microsoft.com/office/powerpoint/2010/main" xmlns:p15="http://schemas.microsoft.com/office/powerpoint/2012/main" xmlns:ahyp="http://schemas.microsoft.com/office/drawing/2018/hyperlinkcolor">
   <p:cSld>
     <p:spTree>
       <p:nvGrpSpPr>
-        <p:cNvPr id="386" name="Shape 386"/>
+        <p:cNvPr id="401" name="Shape 401"/>
         <p:cNvGrpSpPr/>
         <p:nvPr/>
       </p:nvGrpSpPr>
@@ -16555,7 +16831,7 @@
       </p:grpSpPr>
       <p:sp>
         <p:nvSpPr>
-          <p:cNvPr id="387" name="Google Shape;387;p23"/>
+          <p:cNvPr id="402" name="Google Shape;402;p24"/>
           <p:cNvSpPr txBox="1"/>
           <p:nvPr>
             <p:ph type="title"/>
@@ -16595,7 +16871,7 @@
       </p:sp>
       <p:sp>
         <p:nvSpPr>
-          <p:cNvPr id="388" name="Google Shape;388;p23"/>
+          <p:cNvPr id="403" name="Google Shape;403;p24"/>
           <p:cNvSpPr txBox="1"/>
           <p:nvPr>
             <p:ph idx="1" type="body"/>
@@ -17514,6 +17790,58 @@
               <a:solidFill>
                 <a:srgbClr val="FF0000"/>
               </a:solidFill>
+            </a:endParaRPr>
+          </a:p>
+        </p:txBody>
+      </p:sp>
+      <p:sp>
+        <p:nvSpPr>
+          <p:cNvPr id="299" name="Google Shape;299;p14"/>
+          <p:cNvSpPr txBox="1"/>
+          <p:nvPr/>
+        </p:nvSpPr>
+        <p:spPr>
+          <a:xfrm>
+            <a:off x="21700" y="0"/>
+            <a:ext cx="1594800" cy="400200"/>
+          </a:xfrm>
+          <a:prstGeom prst="rect">
+            <a:avLst/>
+          </a:prstGeom>
+          <a:noFill/>
+          <a:ln>
+            <a:noFill/>
+          </a:ln>
+        </p:spPr>
+        <p:txBody>
+          <a:bodyPr anchorCtr="0" anchor="t" bIns="91425" lIns="91425" spcFirstLastPara="1" rIns="91425" wrap="square" tIns="91425">
+            <a:spAutoFit/>
+          </a:bodyPr>
+          <a:lstStyle/>
+          <a:p>
+            <a:pPr indent="0" lvl="0" marL="0" rtl="0" algn="l">
+              <a:spcBef>
+                <a:spcPts val="0"/>
+              </a:spcBef>
+              <a:spcAft>
+                <a:spcPts val="0"/>
+              </a:spcAft>
+              <a:buNone/>
+            </a:pPr>
+            <a:r>
+              <a:rPr lang="en">
+                <a:latin typeface="Nunito"/>
+                <a:ea typeface="Nunito"/>
+                <a:cs typeface="Nunito"/>
+                <a:sym typeface="Nunito"/>
+              </a:rPr>
+              <a:t>Kaushal Binjola</a:t>
+            </a:r>
+            <a:endParaRPr>
+              <a:latin typeface="Nunito"/>
+              <a:ea typeface="Nunito"/>
+              <a:cs typeface="Nunito"/>
+              <a:sym typeface="Nunito"/>
             </a:endParaRPr>
           </a:p>
         </p:txBody>
@@ -18110,7 +18438,7 @@
   <p:cSld>
     <p:spTree>
       <p:nvGrpSpPr>
-        <p:cNvPr id="302" name="Shape 302"/>
+        <p:cNvPr id="303" name="Shape 303"/>
         <p:cNvGrpSpPr/>
         <p:nvPr/>
       </p:nvGrpSpPr>
@@ -18124,7 +18452,7 @@
       </p:grpSpPr>
       <p:sp>
         <p:nvSpPr>
-          <p:cNvPr id="303" name="Google Shape;303;p15"/>
+          <p:cNvPr id="304" name="Google Shape;304;p15"/>
           <p:cNvSpPr txBox="1"/>
           <p:nvPr/>
         </p:nvSpPr>
@@ -18182,7 +18510,7 @@
       </p:sp>
       <p:grpSp>
         <p:nvGrpSpPr>
-          <p:cNvPr id="304" name="Google Shape;304;p15"/>
+          <p:cNvPr id="305" name="Google Shape;305;p15"/>
           <p:cNvGrpSpPr/>
           <p:nvPr/>
         </p:nvGrpSpPr>
@@ -18196,7 +18524,7 @@
         </p:grpSpPr>
         <p:sp>
           <p:nvSpPr>
-            <p:cNvPr id="305" name="Google Shape;305;p15"/>
+            <p:cNvPr id="306" name="Google Shape;306;p15"/>
             <p:cNvSpPr/>
             <p:nvPr/>
           </p:nvSpPr>
@@ -18242,7 +18570,7 @@
         </p:sp>
         <p:sp>
           <p:nvSpPr>
-            <p:cNvPr id="306" name="Google Shape;306;p15"/>
+            <p:cNvPr id="307" name="Google Shape;307;p15"/>
             <p:cNvSpPr txBox="1"/>
             <p:nvPr/>
           </p:nvSpPr>
@@ -18300,7 +18628,7 @@
         </p:sp>
         <p:sp>
           <p:nvSpPr>
-            <p:cNvPr id="307" name="Google Shape;307;p15"/>
+            <p:cNvPr id="308" name="Google Shape;308;p15"/>
             <p:cNvSpPr txBox="1"/>
             <p:nvPr/>
           </p:nvSpPr>
@@ -18457,7 +18785,7 @@
       </p:grpSp>
       <p:grpSp>
         <p:nvGrpSpPr>
-          <p:cNvPr id="308" name="Google Shape;308;p15"/>
+          <p:cNvPr id="309" name="Google Shape;309;p15"/>
           <p:cNvGrpSpPr/>
           <p:nvPr/>
         </p:nvGrpSpPr>
@@ -18471,7 +18799,7 @@
         </p:grpSpPr>
         <p:sp>
           <p:nvSpPr>
-            <p:cNvPr id="309" name="Google Shape;309;p15"/>
+            <p:cNvPr id="310" name="Google Shape;310;p15"/>
             <p:cNvSpPr/>
             <p:nvPr/>
           </p:nvSpPr>
@@ -18517,7 +18845,7 @@
         </p:sp>
         <p:sp>
           <p:nvSpPr>
-            <p:cNvPr id="310" name="Google Shape;310;p15"/>
+            <p:cNvPr id="311" name="Google Shape;311;p15"/>
             <p:cNvSpPr txBox="1"/>
             <p:nvPr/>
           </p:nvSpPr>
@@ -18575,7 +18903,7 @@
         </p:sp>
         <p:sp>
           <p:nvSpPr>
-            <p:cNvPr id="311" name="Google Shape;311;p15"/>
+            <p:cNvPr id="312" name="Google Shape;312;p15"/>
             <p:cNvSpPr txBox="1"/>
             <p:nvPr/>
           </p:nvSpPr>
@@ -18687,7 +19015,7 @@
       </p:grpSp>
       <p:grpSp>
         <p:nvGrpSpPr>
-          <p:cNvPr id="312" name="Google Shape;312;p15"/>
+          <p:cNvPr id="313" name="Google Shape;313;p15"/>
           <p:cNvGrpSpPr/>
           <p:nvPr/>
         </p:nvGrpSpPr>
@@ -18701,7 +19029,7 @@
         </p:grpSpPr>
         <p:sp>
           <p:nvSpPr>
-            <p:cNvPr id="313" name="Google Shape;313;p15"/>
+            <p:cNvPr id="314" name="Google Shape;314;p15"/>
             <p:cNvSpPr/>
             <p:nvPr/>
           </p:nvSpPr>
@@ -18792,7 +19120,7 @@
         </p:sp>
         <p:sp>
           <p:nvSpPr>
-            <p:cNvPr id="314" name="Google Shape;314;p15"/>
+            <p:cNvPr id="315" name="Google Shape;315;p15"/>
             <p:cNvSpPr txBox="1"/>
             <p:nvPr/>
           </p:nvSpPr>
@@ -18842,7 +19170,7 @@
         </p:sp>
         <p:sp>
           <p:nvSpPr>
-            <p:cNvPr id="315" name="Google Shape;315;p15"/>
+            <p:cNvPr id="316" name="Google Shape;316;p15"/>
             <p:cNvSpPr txBox="1"/>
             <p:nvPr/>
           </p:nvSpPr>
@@ -18896,7 +19224,7 @@
       </p:grpSp>
       <p:grpSp>
         <p:nvGrpSpPr>
-          <p:cNvPr id="316" name="Google Shape;316;p15"/>
+          <p:cNvPr id="317" name="Google Shape;317;p15"/>
           <p:cNvGrpSpPr/>
           <p:nvPr/>
         </p:nvGrpSpPr>
@@ -18910,7 +19238,7 @@
         </p:grpSpPr>
         <p:sp>
           <p:nvSpPr>
-            <p:cNvPr id="317" name="Google Shape;317;p15"/>
+            <p:cNvPr id="318" name="Google Shape;318;p15"/>
             <p:cNvSpPr/>
             <p:nvPr/>
           </p:nvSpPr>
@@ -18953,7 +19281,7 @@
         </p:sp>
         <p:sp>
           <p:nvSpPr>
-            <p:cNvPr id="318" name="Google Shape;318;p15"/>
+            <p:cNvPr id="319" name="Google Shape;319;p15"/>
             <p:cNvSpPr/>
             <p:nvPr/>
           </p:nvSpPr>
@@ -19000,7 +19328,7 @@
       </p:grpSp>
       <p:sp>
         <p:nvSpPr>
-          <p:cNvPr id="319" name="Google Shape;319;p15"/>
+          <p:cNvPr id="320" name="Google Shape;320;p15"/>
           <p:cNvSpPr/>
           <p:nvPr/>
         </p:nvSpPr>
@@ -19042,6 +19370,58 @@
           </a:p>
         </p:txBody>
       </p:sp>
+      <p:sp>
+        <p:nvSpPr>
+          <p:cNvPr id="321" name="Google Shape;321;p15"/>
+          <p:cNvSpPr txBox="1"/>
+          <p:nvPr/>
+        </p:nvSpPr>
+        <p:spPr>
+          <a:xfrm>
+            <a:off x="21700" y="0"/>
+            <a:ext cx="1594800" cy="400200"/>
+          </a:xfrm>
+          <a:prstGeom prst="rect">
+            <a:avLst/>
+          </a:prstGeom>
+          <a:noFill/>
+          <a:ln>
+            <a:noFill/>
+          </a:ln>
+        </p:spPr>
+        <p:txBody>
+          <a:bodyPr anchorCtr="0" anchor="t" bIns="91425" lIns="91425" spcFirstLastPara="1" rIns="91425" wrap="square" tIns="91425">
+            <a:spAutoFit/>
+          </a:bodyPr>
+          <a:lstStyle/>
+          <a:p>
+            <a:pPr indent="0" lvl="0" marL="0" rtl="0" algn="l">
+              <a:spcBef>
+                <a:spcPts val="0"/>
+              </a:spcBef>
+              <a:spcAft>
+                <a:spcPts val="0"/>
+              </a:spcAft>
+              <a:buNone/>
+            </a:pPr>
+            <a:r>
+              <a:rPr lang="en">
+                <a:latin typeface="Nunito"/>
+                <a:ea typeface="Nunito"/>
+                <a:cs typeface="Nunito"/>
+                <a:sym typeface="Nunito"/>
+              </a:rPr>
+              <a:t>Kaushal Binjola</a:t>
+            </a:r>
+            <a:endParaRPr>
+              <a:latin typeface="Nunito"/>
+              <a:ea typeface="Nunito"/>
+              <a:cs typeface="Nunito"/>
+              <a:sym typeface="Nunito"/>
+            </a:endParaRPr>
+          </a:p>
+        </p:txBody>
+      </p:sp>
     </p:spTree>
   </p:cSld>
   <p:clrMapOvr>
@@ -19055,253 +19435,6 @@
             <p:seq concurrent="1" nextAc="seek">
               <p:cTn dur="indefinite" id="2" nodeType="mainSeq">
                 <p:childTnLst>
-                  <p:par>
-                    <p:cTn fill="hold">
-                      <p:stCondLst>
-                        <p:cond delay="indefinite"/>
-                      </p:stCondLst>
-                      <p:childTnLst>
-                        <p:par>
-                          <p:cTn fill="hold">
-                            <p:stCondLst>
-                              <p:cond delay="0"/>
-                            </p:stCondLst>
-                            <p:childTnLst>
-                              <p:par>
-                                <p:cTn fill="hold" nodeType="clickEffect" presetClass="entr" presetID="10" presetSubtype="0">
-                                  <p:stCondLst>
-                                    <p:cond delay="0"/>
-                                  </p:stCondLst>
-                                  <p:childTnLst>
-                                    <p:set>
-                                      <p:cBhvr>
-                                        <p:cTn dur="1" fill="hold">
-                                          <p:stCondLst>
-                                            <p:cond delay="0"/>
-                                          </p:stCondLst>
-                                        </p:cTn>
-                                        <p:tgtEl>
-                                          <p:spTgt spid="303"/>
-                                        </p:tgtEl>
-                                        <p:attrNameLst>
-                                          <p:attrName>style.visibility</p:attrName>
-                                        </p:attrNameLst>
-                                      </p:cBhvr>
-                                      <p:to>
-                                        <p:strVal val="visible"/>
-                                      </p:to>
-                                    </p:set>
-                                    <p:animEffect filter="fade" transition="in">
-                                      <p:cBhvr>
-                                        <p:cTn dur="1000"/>
-                                        <p:tgtEl>
-                                          <p:spTgt spid="303"/>
-                                        </p:tgtEl>
-                                      </p:cBhvr>
-                                    </p:animEffect>
-                                  </p:childTnLst>
-                                </p:cTn>
-                              </p:par>
-                            </p:childTnLst>
-                          </p:cTn>
-                        </p:par>
-                      </p:childTnLst>
-                    </p:cTn>
-                  </p:par>
-                  <p:par>
-                    <p:cTn fill="hold">
-                      <p:stCondLst>
-                        <p:cond delay="indefinite"/>
-                      </p:stCondLst>
-                      <p:childTnLst>
-                        <p:par>
-                          <p:cTn fill="hold">
-                            <p:stCondLst>
-                              <p:cond delay="0"/>
-                            </p:stCondLst>
-                            <p:childTnLst>
-                              <p:par>
-                                <p:cTn fill="hold" nodeType="clickEffect" presetClass="entr" presetID="10" presetSubtype="0">
-                                  <p:stCondLst>
-                                    <p:cond delay="0"/>
-                                  </p:stCondLst>
-                                  <p:childTnLst>
-                                    <p:set>
-                                      <p:cBhvr>
-                                        <p:cTn dur="1" fill="hold">
-                                          <p:stCondLst>
-                                            <p:cond delay="0"/>
-                                          </p:stCondLst>
-                                        </p:cTn>
-                                        <p:tgtEl>
-                                          <p:spTgt spid="312"/>
-                                        </p:tgtEl>
-                                        <p:attrNameLst>
-                                          <p:attrName>style.visibility</p:attrName>
-                                        </p:attrNameLst>
-                                      </p:cBhvr>
-                                      <p:to>
-                                        <p:strVal val="visible"/>
-                                      </p:to>
-                                    </p:set>
-                                    <p:animEffect filter="fade" transition="in">
-                                      <p:cBhvr>
-                                        <p:cTn dur="1000"/>
-                                        <p:tgtEl>
-                                          <p:spTgt spid="312"/>
-                                        </p:tgtEl>
-                                      </p:cBhvr>
-                                    </p:animEffect>
-                                  </p:childTnLst>
-                                </p:cTn>
-                              </p:par>
-                              <p:par>
-                                <p:cTn fill="hold" nodeType="withEffect" presetClass="entr" presetID="10" presetSubtype="0">
-                                  <p:stCondLst>
-                                    <p:cond delay="0"/>
-                                  </p:stCondLst>
-                                  <p:childTnLst>
-                                    <p:set>
-                                      <p:cBhvr>
-                                        <p:cTn dur="1" fill="hold">
-                                          <p:stCondLst>
-                                            <p:cond delay="0"/>
-                                          </p:stCondLst>
-                                        </p:cTn>
-                                        <p:tgtEl>
-                                          <p:spTgt spid="316"/>
-                                        </p:tgtEl>
-                                        <p:attrNameLst>
-                                          <p:attrName>style.visibility</p:attrName>
-                                        </p:attrNameLst>
-                                      </p:cBhvr>
-                                      <p:to>
-                                        <p:strVal val="visible"/>
-                                      </p:to>
-                                    </p:set>
-                                    <p:animEffect filter="fade" transition="in">
-                                      <p:cBhvr>
-                                        <p:cTn dur="1000"/>
-                                        <p:tgtEl>
-                                          <p:spTgt spid="316"/>
-                                        </p:tgtEl>
-                                      </p:cBhvr>
-                                    </p:animEffect>
-                                  </p:childTnLst>
-                                </p:cTn>
-                              </p:par>
-                            </p:childTnLst>
-                          </p:cTn>
-                        </p:par>
-                      </p:childTnLst>
-                    </p:cTn>
-                  </p:par>
-                  <p:par>
-                    <p:cTn fill="hold">
-                      <p:stCondLst>
-                        <p:cond delay="indefinite"/>
-                      </p:stCondLst>
-                      <p:childTnLst>
-                        <p:par>
-                          <p:cTn fill="hold">
-                            <p:stCondLst>
-                              <p:cond delay="0"/>
-                            </p:stCondLst>
-                            <p:childTnLst>
-                              <p:par>
-                                <p:cTn fill="hold" nodeType="clickEffect" presetClass="entr" presetID="10" presetSubtype="0">
-                                  <p:stCondLst>
-                                    <p:cond delay="0"/>
-                                  </p:stCondLst>
-                                  <p:childTnLst>
-                                    <p:set>
-                                      <p:cBhvr>
-                                        <p:cTn dur="1" fill="hold">
-                                          <p:stCondLst>
-                                            <p:cond delay="0"/>
-                                          </p:stCondLst>
-                                        </p:cTn>
-                                        <p:tgtEl>
-                                          <p:spTgt spid="308"/>
-                                        </p:tgtEl>
-                                        <p:attrNameLst>
-                                          <p:attrName>style.visibility</p:attrName>
-                                        </p:attrNameLst>
-                                      </p:cBhvr>
-                                      <p:to>
-                                        <p:strVal val="visible"/>
-                                      </p:to>
-                                    </p:set>
-                                    <p:animEffect filter="fade" transition="in">
-                                      <p:cBhvr>
-                                        <p:cTn dur="1000"/>
-                                        <p:tgtEl>
-                                          <p:spTgt spid="308"/>
-                                        </p:tgtEl>
-                                      </p:cBhvr>
-                                    </p:animEffect>
-                                  </p:childTnLst>
-                                </p:cTn>
-                              </p:par>
-                            </p:childTnLst>
-                          </p:cTn>
-                        </p:par>
-                      </p:childTnLst>
-                    </p:cTn>
-                  </p:par>
-                  <p:par>
-                    <p:cTn fill="hold">
-                      <p:stCondLst>
-                        <p:cond delay="indefinite"/>
-                      </p:stCondLst>
-                      <p:childTnLst>
-                        <p:par>
-                          <p:cTn fill="hold">
-                            <p:stCondLst>
-                              <p:cond delay="0"/>
-                            </p:stCondLst>
-                            <p:childTnLst>
-                              <p:par>
-                                <p:cTn fill="hold" nodeType="clickEffect" presetClass="entr" presetID="10" presetSubtype="0">
-                                  <p:stCondLst>
-                                    <p:cond delay="0"/>
-                                  </p:stCondLst>
-                                  <p:childTnLst>
-                                    <p:set>
-                                      <p:cBhvr>
-                                        <p:cTn dur="1" fill="hold">
-                                          <p:stCondLst>
-                                            <p:cond delay="0"/>
-                                          </p:stCondLst>
-                                        </p:cTn>
-                                        <p:tgtEl>
-                                          <p:spTgt spid="319"/>
-                                        </p:tgtEl>
-                                        <p:attrNameLst>
-                                          <p:attrName>style.visibility</p:attrName>
-                                        </p:attrNameLst>
-                                      </p:cBhvr>
-                                      <p:to>
-                                        <p:strVal val="visible"/>
-                                      </p:to>
-                                    </p:set>
-                                    <p:animEffect filter="fade" transition="in">
-                                      <p:cBhvr>
-                                        <p:cTn dur="1000"/>
-                                        <p:tgtEl>
-                                          <p:spTgt spid="319"/>
-                                        </p:tgtEl>
-                                      </p:cBhvr>
-                                    </p:animEffect>
-                                  </p:childTnLst>
-                                </p:cTn>
-                              </p:par>
-                            </p:childTnLst>
-                          </p:cTn>
-                        </p:par>
-                      </p:childTnLst>
-                    </p:cTn>
-                  </p:par>
                   <p:par>
                     <p:cTn fill="hold">
                       <p:stCondLst>
@@ -19355,6 +19488,253 @@
                       </p:childTnLst>
                     </p:cTn>
                   </p:par>
+                  <p:par>
+                    <p:cTn fill="hold">
+                      <p:stCondLst>
+                        <p:cond delay="indefinite"/>
+                      </p:stCondLst>
+                      <p:childTnLst>
+                        <p:par>
+                          <p:cTn fill="hold">
+                            <p:stCondLst>
+                              <p:cond delay="0"/>
+                            </p:stCondLst>
+                            <p:childTnLst>
+                              <p:par>
+                                <p:cTn fill="hold" nodeType="clickEffect" presetClass="entr" presetID="10" presetSubtype="0">
+                                  <p:stCondLst>
+                                    <p:cond delay="0"/>
+                                  </p:stCondLst>
+                                  <p:childTnLst>
+                                    <p:set>
+                                      <p:cBhvr>
+                                        <p:cTn dur="1" fill="hold">
+                                          <p:stCondLst>
+                                            <p:cond delay="0"/>
+                                          </p:stCondLst>
+                                        </p:cTn>
+                                        <p:tgtEl>
+                                          <p:spTgt spid="313"/>
+                                        </p:tgtEl>
+                                        <p:attrNameLst>
+                                          <p:attrName>style.visibility</p:attrName>
+                                        </p:attrNameLst>
+                                      </p:cBhvr>
+                                      <p:to>
+                                        <p:strVal val="visible"/>
+                                      </p:to>
+                                    </p:set>
+                                    <p:animEffect filter="fade" transition="in">
+                                      <p:cBhvr>
+                                        <p:cTn dur="1000"/>
+                                        <p:tgtEl>
+                                          <p:spTgt spid="313"/>
+                                        </p:tgtEl>
+                                      </p:cBhvr>
+                                    </p:animEffect>
+                                  </p:childTnLst>
+                                </p:cTn>
+                              </p:par>
+                              <p:par>
+                                <p:cTn fill="hold" nodeType="withEffect" presetClass="entr" presetID="10" presetSubtype="0">
+                                  <p:stCondLst>
+                                    <p:cond delay="0"/>
+                                  </p:stCondLst>
+                                  <p:childTnLst>
+                                    <p:set>
+                                      <p:cBhvr>
+                                        <p:cTn dur="1" fill="hold">
+                                          <p:stCondLst>
+                                            <p:cond delay="0"/>
+                                          </p:stCondLst>
+                                        </p:cTn>
+                                        <p:tgtEl>
+                                          <p:spTgt spid="317"/>
+                                        </p:tgtEl>
+                                        <p:attrNameLst>
+                                          <p:attrName>style.visibility</p:attrName>
+                                        </p:attrNameLst>
+                                      </p:cBhvr>
+                                      <p:to>
+                                        <p:strVal val="visible"/>
+                                      </p:to>
+                                    </p:set>
+                                    <p:animEffect filter="fade" transition="in">
+                                      <p:cBhvr>
+                                        <p:cTn dur="1000"/>
+                                        <p:tgtEl>
+                                          <p:spTgt spid="317"/>
+                                        </p:tgtEl>
+                                      </p:cBhvr>
+                                    </p:animEffect>
+                                  </p:childTnLst>
+                                </p:cTn>
+                              </p:par>
+                            </p:childTnLst>
+                          </p:cTn>
+                        </p:par>
+                      </p:childTnLst>
+                    </p:cTn>
+                  </p:par>
+                  <p:par>
+                    <p:cTn fill="hold">
+                      <p:stCondLst>
+                        <p:cond delay="indefinite"/>
+                      </p:stCondLst>
+                      <p:childTnLst>
+                        <p:par>
+                          <p:cTn fill="hold">
+                            <p:stCondLst>
+                              <p:cond delay="0"/>
+                            </p:stCondLst>
+                            <p:childTnLst>
+                              <p:par>
+                                <p:cTn fill="hold" nodeType="clickEffect" presetClass="entr" presetID="10" presetSubtype="0">
+                                  <p:stCondLst>
+                                    <p:cond delay="0"/>
+                                  </p:stCondLst>
+                                  <p:childTnLst>
+                                    <p:set>
+                                      <p:cBhvr>
+                                        <p:cTn dur="1" fill="hold">
+                                          <p:stCondLst>
+                                            <p:cond delay="0"/>
+                                          </p:stCondLst>
+                                        </p:cTn>
+                                        <p:tgtEl>
+                                          <p:spTgt spid="309"/>
+                                        </p:tgtEl>
+                                        <p:attrNameLst>
+                                          <p:attrName>style.visibility</p:attrName>
+                                        </p:attrNameLst>
+                                      </p:cBhvr>
+                                      <p:to>
+                                        <p:strVal val="visible"/>
+                                      </p:to>
+                                    </p:set>
+                                    <p:animEffect filter="fade" transition="in">
+                                      <p:cBhvr>
+                                        <p:cTn dur="1000"/>
+                                        <p:tgtEl>
+                                          <p:spTgt spid="309"/>
+                                        </p:tgtEl>
+                                      </p:cBhvr>
+                                    </p:animEffect>
+                                  </p:childTnLst>
+                                </p:cTn>
+                              </p:par>
+                            </p:childTnLst>
+                          </p:cTn>
+                        </p:par>
+                      </p:childTnLst>
+                    </p:cTn>
+                  </p:par>
+                  <p:par>
+                    <p:cTn fill="hold">
+                      <p:stCondLst>
+                        <p:cond delay="indefinite"/>
+                      </p:stCondLst>
+                      <p:childTnLst>
+                        <p:par>
+                          <p:cTn fill="hold">
+                            <p:stCondLst>
+                              <p:cond delay="0"/>
+                            </p:stCondLst>
+                            <p:childTnLst>
+                              <p:par>
+                                <p:cTn fill="hold" nodeType="clickEffect" presetClass="entr" presetID="10" presetSubtype="0">
+                                  <p:stCondLst>
+                                    <p:cond delay="0"/>
+                                  </p:stCondLst>
+                                  <p:childTnLst>
+                                    <p:set>
+                                      <p:cBhvr>
+                                        <p:cTn dur="1" fill="hold">
+                                          <p:stCondLst>
+                                            <p:cond delay="0"/>
+                                          </p:stCondLst>
+                                        </p:cTn>
+                                        <p:tgtEl>
+                                          <p:spTgt spid="320"/>
+                                        </p:tgtEl>
+                                        <p:attrNameLst>
+                                          <p:attrName>style.visibility</p:attrName>
+                                        </p:attrNameLst>
+                                      </p:cBhvr>
+                                      <p:to>
+                                        <p:strVal val="visible"/>
+                                      </p:to>
+                                    </p:set>
+                                    <p:animEffect filter="fade" transition="in">
+                                      <p:cBhvr>
+                                        <p:cTn dur="1000"/>
+                                        <p:tgtEl>
+                                          <p:spTgt spid="320"/>
+                                        </p:tgtEl>
+                                      </p:cBhvr>
+                                    </p:animEffect>
+                                  </p:childTnLst>
+                                </p:cTn>
+                              </p:par>
+                            </p:childTnLst>
+                          </p:cTn>
+                        </p:par>
+                      </p:childTnLst>
+                    </p:cTn>
+                  </p:par>
+                  <p:par>
+                    <p:cTn fill="hold">
+                      <p:stCondLst>
+                        <p:cond delay="indefinite"/>
+                      </p:stCondLst>
+                      <p:childTnLst>
+                        <p:par>
+                          <p:cTn fill="hold">
+                            <p:stCondLst>
+                              <p:cond delay="0"/>
+                            </p:stCondLst>
+                            <p:childTnLst>
+                              <p:par>
+                                <p:cTn fill="hold" nodeType="clickEffect" presetClass="entr" presetID="10" presetSubtype="0">
+                                  <p:stCondLst>
+                                    <p:cond delay="0"/>
+                                  </p:stCondLst>
+                                  <p:childTnLst>
+                                    <p:set>
+                                      <p:cBhvr>
+                                        <p:cTn dur="1" fill="hold">
+                                          <p:stCondLst>
+                                            <p:cond delay="0"/>
+                                          </p:stCondLst>
+                                        </p:cTn>
+                                        <p:tgtEl>
+                                          <p:spTgt spid="305"/>
+                                        </p:tgtEl>
+                                        <p:attrNameLst>
+                                          <p:attrName>style.visibility</p:attrName>
+                                        </p:attrNameLst>
+                                      </p:cBhvr>
+                                      <p:to>
+                                        <p:strVal val="visible"/>
+                                      </p:to>
+                                    </p:set>
+                                    <p:animEffect filter="fade" transition="in">
+                                      <p:cBhvr>
+                                        <p:cTn dur="1000"/>
+                                        <p:tgtEl>
+                                          <p:spTgt spid="305"/>
+                                        </p:tgtEl>
+                                      </p:cBhvr>
+                                    </p:animEffect>
+                                  </p:childTnLst>
+                                </p:cTn>
+                              </p:par>
+                            </p:childTnLst>
+                          </p:cTn>
+                        </p:par>
+                      </p:childTnLst>
+                    </p:cTn>
+                  </p:par>
                 </p:childTnLst>
               </p:cTn>
               <p:prevCondLst>
@@ -19385,7 +19765,7 @@
   <p:cSld>
     <p:spTree>
       <p:nvGrpSpPr>
-        <p:cNvPr id="323" name="Shape 323"/>
+        <p:cNvPr id="325" name="Shape 325"/>
         <p:cNvGrpSpPr/>
         <p:nvPr/>
       </p:nvGrpSpPr>
@@ -19399,7 +19779,7 @@
       </p:grpSpPr>
       <p:sp>
         <p:nvSpPr>
-          <p:cNvPr id="324" name="Google Shape;324;p16"/>
+          <p:cNvPr id="326" name="Google Shape;326;p16"/>
           <p:cNvSpPr txBox="1"/>
           <p:nvPr/>
         </p:nvSpPr>
@@ -19457,7 +19837,7 @@
       </p:sp>
       <p:grpSp>
         <p:nvGrpSpPr>
-          <p:cNvPr id="325" name="Google Shape;325;p16"/>
+          <p:cNvPr id="327" name="Google Shape;327;p16"/>
           <p:cNvGrpSpPr/>
           <p:nvPr/>
         </p:nvGrpSpPr>
@@ -19471,7 +19851,7 @@
         </p:grpSpPr>
         <p:sp>
           <p:nvSpPr>
-            <p:cNvPr id="326" name="Google Shape;326;p16"/>
+            <p:cNvPr id="328" name="Google Shape;328;p16"/>
             <p:cNvSpPr/>
             <p:nvPr/>
           </p:nvSpPr>
@@ -19517,7 +19897,7 @@
         </p:sp>
         <p:sp>
           <p:nvSpPr>
-            <p:cNvPr id="327" name="Google Shape;327;p16"/>
+            <p:cNvPr id="329" name="Google Shape;329;p16"/>
             <p:cNvSpPr txBox="1"/>
             <p:nvPr/>
           </p:nvSpPr>
@@ -19575,7 +19955,7 @@
         </p:sp>
         <p:sp>
           <p:nvSpPr>
-            <p:cNvPr id="328" name="Google Shape;328;p16"/>
+            <p:cNvPr id="330" name="Google Shape;330;p16"/>
             <p:cNvSpPr txBox="1"/>
             <p:nvPr/>
           </p:nvSpPr>
@@ -19682,7 +20062,7 @@
       </p:grpSp>
       <p:grpSp>
         <p:nvGrpSpPr>
-          <p:cNvPr id="329" name="Google Shape;329;p16"/>
+          <p:cNvPr id="331" name="Google Shape;331;p16"/>
           <p:cNvGrpSpPr/>
           <p:nvPr/>
         </p:nvGrpSpPr>
@@ -19696,7 +20076,7 @@
         </p:grpSpPr>
         <p:sp>
           <p:nvSpPr>
-            <p:cNvPr id="330" name="Google Shape;330;p16"/>
+            <p:cNvPr id="332" name="Google Shape;332;p16"/>
             <p:cNvSpPr/>
             <p:nvPr/>
           </p:nvSpPr>
@@ -19742,7 +20122,7 @@
         </p:sp>
         <p:sp>
           <p:nvSpPr>
-            <p:cNvPr id="331" name="Google Shape;331;p16"/>
+            <p:cNvPr id="333" name="Google Shape;333;p16"/>
             <p:cNvSpPr txBox="1"/>
             <p:nvPr/>
           </p:nvSpPr>
@@ -19800,7 +20180,7 @@
         </p:sp>
         <p:sp>
           <p:nvSpPr>
-            <p:cNvPr id="332" name="Google Shape;332;p16"/>
+            <p:cNvPr id="334" name="Google Shape;334;p16"/>
             <p:cNvSpPr txBox="1"/>
             <p:nvPr/>
           </p:nvSpPr>
@@ -19916,7 +20296,7 @@
       </p:grpSp>
       <p:grpSp>
         <p:nvGrpSpPr>
-          <p:cNvPr id="333" name="Google Shape;333;p16"/>
+          <p:cNvPr id="335" name="Google Shape;335;p16"/>
           <p:cNvGrpSpPr/>
           <p:nvPr/>
         </p:nvGrpSpPr>
@@ -19930,7 +20310,7 @@
         </p:grpSpPr>
         <p:sp>
           <p:nvSpPr>
-            <p:cNvPr id="334" name="Google Shape;334;p16"/>
+            <p:cNvPr id="336" name="Google Shape;336;p16"/>
             <p:cNvSpPr/>
             <p:nvPr/>
           </p:nvSpPr>
@@ -20021,7 +20401,7 @@
         </p:sp>
         <p:sp>
           <p:nvSpPr>
-            <p:cNvPr id="335" name="Google Shape;335;p16"/>
+            <p:cNvPr id="337" name="Google Shape;337;p16"/>
             <p:cNvSpPr txBox="1"/>
             <p:nvPr/>
           </p:nvSpPr>
@@ -20071,7 +20451,7 @@
         </p:sp>
         <p:sp>
           <p:nvSpPr>
-            <p:cNvPr id="336" name="Google Shape;336;p16"/>
+            <p:cNvPr id="338" name="Google Shape;338;p16"/>
             <p:cNvSpPr txBox="1"/>
             <p:nvPr/>
           </p:nvSpPr>
@@ -20125,7 +20505,7 @@
       </p:grpSp>
       <p:grpSp>
         <p:nvGrpSpPr>
-          <p:cNvPr id="337" name="Google Shape;337;p16"/>
+          <p:cNvPr id="339" name="Google Shape;339;p16"/>
           <p:cNvGrpSpPr/>
           <p:nvPr/>
         </p:nvGrpSpPr>
@@ -20139,7 +20519,7 @@
         </p:grpSpPr>
         <p:sp>
           <p:nvSpPr>
-            <p:cNvPr id="338" name="Google Shape;338;p16"/>
+            <p:cNvPr id="340" name="Google Shape;340;p16"/>
             <p:cNvSpPr/>
             <p:nvPr/>
           </p:nvSpPr>
@@ -20182,7 +20562,7 @@
         </p:sp>
         <p:sp>
           <p:nvSpPr>
-            <p:cNvPr id="339" name="Google Shape;339;p16"/>
+            <p:cNvPr id="341" name="Google Shape;341;p16"/>
             <p:cNvSpPr/>
             <p:nvPr/>
           </p:nvSpPr>
@@ -20229,7 +20609,7 @@
       </p:grpSp>
       <p:sp>
         <p:nvSpPr>
-          <p:cNvPr id="340" name="Google Shape;340;p16"/>
+          <p:cNvPr id="342" name="Google Shape;342;p16"/>
           <p:cNvSpPr/>
           <p:nvPr/>
         </p:nvSpPr>
@@ -20273,7 +20653,7 @@
       </p:sp>
       <p:sp>
         <p:nvSpPr>
-          <p:cNvPr id="341" name="Google Shape;341;p16"/>
+          <p:cNvPr id="343" name="Google Shape;343;p16"/>
           <p:cNvSpPr/>
           <p:nvPr/>
         </p:nvSpPr>
@@ -20324,7 +20704,7 @@
       </p:sp>
       <p:sp>
         <p:nvSpPr>
-          <p:cNvPr id="342" name="Google Shape;342;p16"/>
+          <p:cNvPr id="344" name="Google Shape;344;p16"/>
           <p:cNvSpPr txBox="1"/>
           <p:nvPr/>
         </p:nvSpPr>
@@ -20370,7 +20750,7 @@
       </p:sp>
       <p:sp>
         <p:nvSpPr>
-          <p:cNvPr id="343" name="Google Shape;343;p16"/>
+          <p:cNvPr id="345" name="Google Shape;345;p16"/>
           <p:cNvSpPr txBox="1"/>
           <p:nvPr/>
         </p:nvSpPr>
@@ -20436,7 +20816,7 @@
       </p:sp>
       <p:sp>
         <p:nvSpPr>
-          <p:cNvPr id="344" name="Google Shape;344;p16"/>
+          <p:cNvPr id="346" name="Google Shape;346;p16"/>
           <p:cNvSpPr/>
           <p:nvPr/>
         </p:nvSpPr>
@@ -20498,7 +20878,7 @@
       </p:sp>
       <p:sp>
         <p:nvSpPr>
-          <p:cNvPr id="345" name="Google Shape;345;p16"/>
+          <p:cNvPr id="347" name="Google Shape;347;p16"/>
           <p:cNvSpPr txBox="1"/>
           <p:nvPr/>
         </p:nvSpPr>
@@ -20571,7 +20951,7 @@
       </p:sp>
       <p:sp>
         <p:nvSpPr>
-          <p:cNvPr id="346" name="Google Shape;346;p16"/>
+          <p:cNvPr id="348" name="Google Shape;348;p16"/>
           <p:cNvSpPr txBox="1"/>
           <p:nvPr/>
         </p:nvSpPr>
@@ -20632,6 +21012,58 @@
             </a:pPr>
             <a:r>
               <a:t/>
+            </a:r>
+            <a:endParaRPr>
+              <a:latin typeface="Nunito"/>
+              <a:ea typeface="Nunito"/>
+              <a:cs typeface="Nunito"/>
+              <a:sym typeface="Nunito"/>
+            </a:endParaRPr>
+          </a:p>
+        </p:txBody>
+      </p:sp>
+      <p:sp>
+        <p:nvSpPr>
+          <p:cNvPr id="349" name="Google Shape;349;p16"/>
+          <p:cNvSpPr txBox="1"/>
+          <p:nvPr/>
+        </p:nvSpPr>
+        <p:spPr>
+          <a:xfrm>
+            <a:off x="21700" y="0"/>
+            <a:ext cx="1594800" cy="400200"/>
+          </a:xfrm>
+          <a:prstGeom prst="rect">
+            <a:avLst/>
+          </a:prstGeom>
+          <a:noFill/>
+          <a:ln>
+            <a:noFill/>
+          </a:ln>
+        </p:spPr>
+        <p:txBody>
+          <a:bodyPr anchorCtr="0" anchor="t" bIns="91425" lIns="91425" spcFirstLastPara="1" rIns="91425" wrap="square" tIns="91425">
+            <a:spAutoFit/>
+          </a:bodyPr>
+          <a:lstStyle/>
+          <a:p>
+            <a:pPr indent="0" lvl="0" marL="0" rtl="0" algn="l">
+              <a:spcBef>
+                <a:spcPts val="0"/>
+              </a:spcBef>
+              <a:spcAft>
+                <a:spcPts val="0"/>
+              </a:spcAft>
+              <a:buNone/>
+            </a:pPr>
+            <a:r>
+              <a:rPr lang="en">
+                <a:latin typeface="Nunito"/>
+                <a:ea typeface="Nunito"/>
+                <a:cs typeface="Nunito"/>
+                <a:sym typeface="Nunito"/>
+              </a:rPr>
+              <a:t>Kaushal Binjola</a:t>
             </a:r>
             <a:endParaRPr>
               <a:latin typeface="Nunito"/>
@@ -20681,7 +21113,7 @@
                                           </p:stCondLst>
                                         </p:cTn>
                                         <p:tgtEl>
-                                          <p:spTgt spid="333"/>
+                                          <p:spTgt spid="335"/>
                                         </p:tgtEl>
                                         <p:attrNameLst>
                                           <p:attrName>style.visibility</p:attrName>
@@ -20695,7 +21127,7 @@
                                       <p:cBhvr>
                                         <p:cTn dur="1000"/>
                                         <p:tgtEl>
-                                          <p:spTgt spid="333"/>
+                                          <p:spTgt spid="335"/>
                                         </p:tgtEl>
                                       </p:cBhvr>
                                     </p:animEffect>
@@ -20716,7 +21148,7 @@
                                           </p:stCondLst>
                                         </p:cTn>
                                         <p:tgtEl>
-                                          <p:spTgt spid="337"/>
+                                          <p:spTgt spid="339"/>
                                         </p:tgtEl>
                                         <p:attrNameLst>
                                           <p:attrName>style.visibility</p:attrName>
@@ -20730,7 +21162,7 @@
                                       <p:cBhvr>
                                         <p:cTn dur="1000"/>
                                         <p:tgtEl>
-                                          <p:spTgt spid="337"/>
+                                          <p:spTgt spid="339"/>
                                         </p:tgtEl>
                                       </p:cBhvr>
                                     </p:animEffect>
@@ -20769,7 +21201,7 @@
                                           </p:stCondLst>
                                         </p:cTn>
                                         <p:tgtEl>
-                                          <p:spTgt spid="329"/>
+                                          <p:spTgt spid="331"/>
                                         </p:tgtEl>
                                         <p:attrNameLst>
                                           <p:attrName>style.visibility</p:attrName>
@@ -20783,7 +21215,7 @@
                                       <p:cBhvr>
                                         <p:cTn dur="1000"/>
                                         <p:tgtEl>
-                                          <p:spTgt spid="329"/>
+                                          <p:spTgt spid="331"/>
                                         </p:tgtEl>
                                       </p:cBhvr>
                                     </p:animEffect>
@@ -20822,7 +21254,7 @@
                                           </p:stCondLst>
                                         </p:cTn>
                                         <p:tgtEl>
-                                          <p:spTgt spid="325"/>
+                                          <p:spTgt spid="327"/>
                                         </p:tgtEl>
                                         <p:attrNameLst>
                                           <p:attrName>style.visibility</p:attrName>
@@ -20836,7 +21268,7 @@
                                       <p:cBhvr>
                                         <p:cTn dur="1000"/>
                                         <p:tgtEl>
-                                          <p:spTgt spid="325"/>
+                                          <p:spTgt spid="327"/>
                                         </p:tgtEl>
                                       </p:cBhvr>
                                     </p:animEffect>
@@ -20875,7 +21307,7 @@
                                           </p:stCondLst>
                                         </p:cTn>
                                         <p:tgtEl>
-                                          <p:spTgt spid="340"/>
+                                          <p:spTgt spid="342"/>
                                         </p:tgtEl>
                                         <p:attrNameLst>
                                           <p:attrName>style.visibility</p:attrName>
@@ -20889,78 +21321,10 @@
                                       <p:cBhvr>
                                         <p:cTn dur="1000"/>
                                         <p:tgtEl>
-                                          <p:spTgt spid="340"/>
+                                          <p:spTgt spid="342"/>
                                         </p:tgtEl>
                                       </p:cBhvr>
                                     </p:animEffect>
-                                  </p:childTnLst>
-                                </p:cTn>
-                              </p:par>
-                            </p:childTnLst>
-                          </p:cTn>
-                        </p:par>
-                      </p:childTnLst>
-                    </p:cTn>
-                  </p:par>
-                  <p:par>
-                    <p:cTn fill="hold">
-                      <p:stCondLst>
-                        <p:cond delay="indefinite"/>
-                      </p:stCondLst>
-                      <p:childTnLst>
-                        <p:par>
-                          <p:cTn fill="hold">
-                            <p:stCondLst>
-                              <p:cond delay="0"/>
-                            </p:stCondLst>
-                            <p:childTnLst>
-                              <p:par>
-                                <p:cTn fill="hold" nodeType="clickEffect" presetClass="entr" presetID="2" presetSubtype="4">
-                                  <p:stCondLst>
-                                    <p:cond delay="0"/>
-                                  </p:stCondLst>
-                                  <p:childTnLst>
-                                    <p:set>
-                                      <p:cBhvr>
-                                        <p:cTn dur="1" fill="hold">
-                                          <p:stCondLst>
-                                            <p:cond delay="0"/>
-                                          </p:stCondLst>
-                                        </p:cTn>
-                                        <p:tgtEl>
-                                          <p:spTgt spid="341"/>
-                                        </p:tgtEl>
-                                        <p:attrNameLst>
-                                          <p:attrName>style.visibility</p:attrName>
-                                        </p:attrNameLst>
-                                      </p:cBhvr>
-                                      <p:to>
-                                        <p:strVal val="visible"/>
-                                      </p:to>
-                                    </p:set>
-                                    <p:anim calcmode="lin" valueType="num">
-                                      <p:cBhvr additive="base">
-                                        <p:cTn dur="1000"/>
-                                        <p:tgtEl>
-                                          <p:spTgt spid="341"/>
-                                        </p:tgtEl>
-                                        <p:attrNameLst>
-                                          <p:attrName>ppt_y</p:attrName>
-                                        </p:attrNameLst>
-                                      </p:cBhvr>
-                                      <p:tavLst>
-                                        <p:tav fmla="" tm="0">
-                                          <p:val>
-                                            <p:strVal val="#ppt_y+1"/>
-                                          </p:val>
-                                        </p:tav>
-                                        <p:tav fmla="" tm="100000">
-                                          <p:val>
-                                            <p:strVal val="#ppt_y"/>
-                                          </p:val>
-                                        </p:tav>
-                                      </p:tavLst>
-                                    </p:anim>
                                   </p:childTnLst>
                                 </p:cTn>
                               </p:par>
@@ -21029,59 +21393,6 @@
                                         </p:tav>
                                       </p:tavLst>
                                     </p:anim>
-                                  </p:childTnLst>
-                                </p:cTn>
-                              </p:par>
-                            </p:childTnLst>
-                          </p:cTn>
-                        </p:par>
-                      </p:childTnLst>
-                    </p:cTn>
-                  </p:par>
-                  <p:par>
-                    <p:cTn fill="hold">
-                      <p:stCondLst>
-                        <p:cond delay="indefinite"/>
-                      </p:stCondLst>
-                      <p:childTnLst>
-                        <p:par>
-                          <p:cTn fill="hold">
-                            <p:stCondLst>
-                              <p:cond delay="0"/>
-                            </p:stCondLst>
-                            <p:childTnLst>
-                              <p:par>
-                                <p:cTn fill="hold" nodeType="clickEffect" presetClass="entr" presetID="10" presetSubtype="0">
-                                  <p:stCondLst>
-                                    <p:cond delay="0"/>
-                                  </p:stCondLst>
-                                  <p:childTnLst>
-                                    <p:set>
-                                      <p:cBhvr>
-                                        <p:cTn dur="1" fill="hold">
-                                          <p:stCondLst>
-                                            <p:cond delay="0"/>
-                                          </p:stCondLst>
-                                        </p:cTn>
-                                        <p:tgtEl>
-                                          <p:spTgt spid="344"/>
-                                        </p:tgtEl>
-                                        <p:attrNameLst>
-                                          <p:attrName>style.visibility</p:attrName>
-                                        </p:attrNameLst>
-                                      </p:cBhvr>
-                                      <p:to>
-                                        <p:strVal val="visible"/>
-                                      </p:to>
-                                    </p:set>
-                                    <p:animEffect filter="fade" transition="in">
-                                      <p:cBhvr>
-                                        <p:cTn dur="1000"/>
-                                        <p:tgtEl>
-                                          <p:spTgt spid="344"/>
-                                        </p:tgtEl>
-                                      </p:cBhvr>
-                                    </p:animEffect>
                                   </p:childTnLst>
                                 </p:cTn>
                               </p:par>
@@ -21212,6 +21523,127 @@
                       </p:childTnLst>
                     </p:cTn>
                   </p:par>
+                  <p:par>
+                    <p:cTn fill="hold">
+                      <p:stCondLst>
+                        <p:cond delay="indefinite"/>
+                      </p:stCondLst>
+                      <p:childTnLst>
+                        <p:par>
+                          <p:cTn fill="hold">
+                            <p:stCondLst>
+                              <p:cond delay="0"/>
+                            </p:stCondLst>
+                            <p:childTnLst>
+                              <p:par>
+                                <p:cTn fill="hold" nodeType="clickEffect" presetClass="entr" presetID="2" presetSubtype="4">
+                                  <p:stCondLst>
+                                    <p:cond delay="0"/>
+                                  </p:stCondLst>
+                                  <p:childTnLst>
+                                    <p:set>
+                                      <p:cBhvr>
+                                        <p:cTn dur="1" fill="hold">
+                                          <p:stCondLst>
+                                            <p:cond delay="0"/>
+                                          </p:stCondLst>
+                                        </p:cTn>
+                                        <p:tgtEl>
+                                          <p:spTgt spid="347"/>
+                                        </p:tgtEl>
+                                        <p:attrNameLst>
+                                          <p:attrName>style.visibility</p:attrName>
+                                        </p:attrNameLst>
+                                      </p:cBhvr>
+                                      <p:to>
+                                        <p:strVal val="visible"/>
+                                      </p:to>
+                                    </p:set>
+                                    <p:anim calcmode="lin" valueType="num">
+                                      <p:cBhvr additive="base">
+                                        <p:cTn dur="1000"/>
+                                        <p:tgtEl>
+                                          <p:spTgt spid="347"/>
+                                        </p:tgtEl>
+                                        <p:attrNameLst>
+                                          <p:attrName>ppt_y</p:attrName>
+                                        </p:attrNameLst>
+                                      </p:cBhvr>
+                                      <p:tavLst>
+                                        <p:tav fmla="" tm="0">
+                                          <p:val>
+                                            <p:strVal val="#ppt_y+1"/>
+                                          </p:val>
+                                        </p:tav>
+                                        <p:tav fmla="" tm="100000">
+                                          <p:val>
+                                            <p:strVal val="#ppt_y"/>
+                                          </p:val>
+                                        </p:tav>
+                                      </p:tavLst>
+                                    </p:anim>
+                                  </p:childTnLst>
+                                </p:cTn>
+                              </p:par>
+                            </p:childTnLst>
+                          </p:cTn>
+                        </p:par>
+                      </p:childTnLst>
+                    </p:cTn>
+                  </p:par>
+                  <p:par>
+                    <p:cTn fill="hold">
+                      <p:stCondLst>
+                        <p:cond delay="indefinite"/>
+                      </p:stCondLst>
+                      <p:childTnLst>
+                        <p:par>
+                          <p:cTn fill="hold">
+                            <p:stCondLst>
+                              <p:cond delay="0"/>
+                            </p:stCondLst>
+                            <p:childTnLst>
+                              <p:par>
+                                <p:cTn fill="hold" nodeType="clickEffect" presetClass="entr" presetID="10" presetSubtype="0">
+                                  <p:stCondLst>
+                                    <p:cond delay="0"/>
+                                  </p:stCondLst>
+                                  <p:childTnLst>
+                                    <p:set>
+                                      <p:cBhvr>
+                                        <p:cTn dur="1" fill="hold">
+                                          <p:stCondLst>
+                                            <p:cond delay="0"/>
+                                          </p:stCondLst>
+                                        </p:cTn>
+                                        <p:tgtEl>
+                                          <p:spTgt spid="348"/>
+                                        </p:tgtEl>
+                                        <p:attrNameLst>
+                                          <p:attrName>style.visibility</p:attrName>
+                                        </p:attrNameLst>
+                                      </p:cBhvr>
+                                      <p:to>
+                                        <p:strVal val="visible"/>
+                                      </p:to>
+                                    </p:set>
+                                    <p:animEffect filter="fade" transition="in">
+                                      <p:cBhvr>
+                                        <p:cTn dur="1000"/>
+                                        <p:tgtEl>
+                                          <p:spTgt spid="348"/>
+                                        </p:tgtEl>
+                                      </p:cBhvr>
+                                    </p:animEffect>
+                                  </p:childTnLst>
+                                </p:cTn>
+                              </p:par>
+                            </p:childTnLst>
+                          </p:cTn>
+                        </p:par>
+                      </p:childTnLst>
+                    </p:cTn>
+                  </p:par>
                 </p:childTnLst>
               </p:cTn>
               <p:prevCondLst>
@@ -21242,7 +21674,7 @@
   <p:cSld>
     <p:spTree>
       <p:nvGrpSpPr>
-        <p:cNvPr id="350" name="Shape 350"/>
+        <p:cNvPr id="353" name="Shape 353"/>
         <p:cNvGrpSpPr/>
         <p:nvPr/>
       </p:nvGrpSpPr>
@@ -21256,7 +21688,7 @@
       </p:grpSpPr>
       <p:sp>
         <p:nvSpPr>
-          <p:cNvPr id="351" name="Google Shape;351;p17"/>
+          <p:cNvPr id="354" name="Google Shape;354;p17"/>
           <p:cNvSpPr txBox="1"/>
           <p:nvPr>
             <p:ph type="title"/>
@@ -21296,7 +21728,7 @@
       </p:sp>
       <p:sp>
         <p:nvSpPr>
-          <p:cNvPr id="352" name="Google Shape;352;p17"/>
+          <p:cNvPr id="355" name="Google Shape;355;p17"/>
           <p:cNvSpPr txBox="1"/>
           <p:nvPr>
             <p:ph idx="1" type="body"/>
@@ -21304,8 +21736,8 @@
         </p:nvSpPr>
         <p:spPr>
           <a:xfrm>
-            <a:off x="1056750" y="1918875"/>
-            <a:ext cx="7030500" cy="2541600"/>
+            <a:off x="845375" y="1749125"/>
+            <a:ext cx="7233000" cy="2862600"/>
           </a:xfrm>
           <a:prstGeom prst="rect">
             <a:avLst/>
@@ -21329,7 +21761,7 @@
             </a:pPr>
             <a:r>
               <a:rPr lang="en"/>
-              <a:t>Various mathematical derivation studied such as “Calumation Problem”, “Rusell’s Barber”, “Oracle halting problem”, “Specification halting problem”, “Mimic halting problem”, “Simple halting problem”...</a:t>
+              <a:t>Various mathematical derivation were studied such as “Calumation Problem”, “Rusell’s Barber”, “Oracle halting problem”, “Specification halting problem”, “Mimic halting problem”, “Simple halting problem”...</a:t>
             </a:r>
             <a:endParaRPr/>
           </a:p>
@@ -21400,9 +21832,61 @@
             </a:pPr>
             <a:r>
               <a:rPr lang="en"/>
-              <a:t>It is difficult to compute that a program is going to end up being infinite since the input variables that are provided to that function/program are only determined on execution.</a:t>
+              <a:t>This function “H” is explained on the next slide in one of the mathematical derivations studied in the whole paper. Various derivations use various function names but the functionality at the end remains the same. ( i.e. infinite running of the program )</a:t>
             </a:r>
             <a:endParaRPr/>
+          </a:p>
+        </p:txBody>
+      </p:sp>
+      <p:sp>
+        <p:nvSpPr>
+          <p:cNvPr id="356" name="Google Shape;356;p17"/>
+          <p:cNvSpPr txBox="1"/>
+          <p:nvPr/>
+        </p:nvSpPr>
+        <p:spPr>
+          <a:xfrm>
+            <a:off x="21700" y="0"/>
+            <a:ext cx="1594800" cy="400200"/>
+          </a:xfrm>
+          <a:prstGeom prst="rect">
+            <a:avLst/>
+          </a:prstGeom>
+          <a:noFill/>
+          <a:ln>
+            <a:noFill/>
+          </a:ln>
+        </p:spPr>
+        <p:txBody>
+          <a:bodyPr anchorCtr="0" anchor="t" bIns="91425" lIns="91425" spcFirstLastPara="1" rIns="91425" wrap="square" tIns="91425">
+            <a:spAutoFit/>
+          </a:bodyPr>
+          <a:lstStyle/>
+          <a:p>
+            <a:pPr indent="0" lvl="0" marL="0" rtl="0" algn="l">
+              <a:spcBef>
+                <a:spcPts val="0"/>
+              </a:spcBef>
+              <a:spcAft>
+                <a:spcPts val="0"/>
+              </a:spcAft>
+              <a:buNone/>
+            </a:pPr>
+            <a:r>
+              <a:rPr lang="en">
+                <a:latin typeface="Nunito"/>
+                <a:ea typeface="Nunito"/>
+                <a:cs typeface="Nunito"/>
+                <a:sym typeface="Nunito"/>
+              </a:rPr>
+              <a:t>Kevin Joshi</a:t>
+            </a:r>
+            <a:endParaRPr>
+              <a:latin typeface="Nunito"/>
+              <a:ea typeface="Nunito"/>
+              <a:cs typeface="Nunito"/>
+              <a:sym typeface="Nunito"/>
+            </a:endParaRPr>
           </a:p>
         </p:txBody>
       </p:sp>
@@ -21419,7 +21903,112 @@
   <p:cSld>
     <p:spTree>
       <p:nvGrpSpPr>
-        <p:cNvPr id="356" name="Shape 356"/>
+        <p:cNvPr id="360" name="Shape 360"/>
+        <p:cNvGrpSpPr/>
+        <p:nvPr/>
+      </p:nvGrpSpPr>
+      <p:grpSpPr>
+        <a:xfrm>
+          <a:off x="0" y="0"/>
+          <a:ext cx="0" cy="0"/>
+          <a:chOff x="0" y="0"/>
+          <a:chExt cx="0" cy="0"/>
+        </a:xfrm>
+      </p:grpSpPr>
+      <p:pic>
+        <p:nvPicPr>
+          <p:cNvPr id="361" name="Google Shape;361;p18"/>
+          <p:cNvPicPr preferRelativeResize="0"/>
+          <p:nvPr/>
+        </p:nvPicPr>
+        <p:blipFill>
+          <a:blip r:embed="rId3">
+            <a:alphaModFix/>
+          </a:blip>
+          <a:stretch>
+            <a:fillRect/>
+          </a:stretch>
+        </p:blipFill>
+        <p:spPr>
+          <a:xfrm>
+            <a:off x="1619250" y="185725"/>
+            <a:ext cx="5905500" cy="4772025"/>
+          </a:xfrm>
+          <a:prstGeom prst="rect">
+            <a:avLst/>
+          </a:prstGeom>
+          <a:noFill/>
+          <a:ln>
+            <a:noFill/>
+          </a:ln>
+        </p:spPr>
+      </p:pic>
+      <p:sp>
+        <p:nvSpPr>
+          <p:cNvPr id="362" name="Google Shape;362;p18"/>
+          <p:cNvSpPr txBox="1"/>
+          <p:nvPr/>
+        </p:nvSpPr>
+        <p:spPr>
+          <a:xfrm>
+            <a:off x="21700" y="0"/>
+            <a:ext cx="1594800" cy="400200"/>
+          </a:xfrm>
+          <a:prstGeom prst="rect">
+            <a:avLst/>
+          </a:prstGeom>
+          <a:noFill/>
+          <a:ln>
+            <a:noFill/>
+          </a:ln>
+        </p:spPr>
+        <p:txBody>
+          <a:bodyPr anchorCtr="0" anchor="t" bIns="91425" lIns="91425" spcFirstLastPara="1" rIns="91425" wrap="square" tIns="91425">
+            <a:spAutoFit/>
+          </a:bodyPr>
+          <a:lstStyle/>
+          <a:p>
+            <a:pPr indent="0" lvl="0" marL="0" rtl="0" algn="l">
+              <a:spcBef>
+                <a:spcPts val="0"/>
+              </a:spcBef>
+              <a:spcAft>
+                <a:spcPts val="0"/>
+              </a:spcAft>
+              <a:buNone/>
+            </a:pPr>
+            <a:r>
+              <a:rPr lang="en">
+                <a:latin typeface="Nunito"/>
+                <a:ea typeface="Nunito"/>
+                <a:cs typeface="Nunito"/>
+                <a:sym typeface="Nunito"/>
+              </a:rPr>
+              <a:t>Kevin Joshi</a:t>
+            </a:r>
+            <a:endParaRPr>
+              <a:latin typeface="Nunito"/>
+              <a:ea typeface="Nunito"/>
+              <a:cs typeface="Nunito"/>
+              <a:sym typeface="Nunito"/>
+            </a:endParaRPr>
+          </a:p>
+        </p:txBody>
+      </p:sp>
+    </p:spTree>
+  </p:cSld>
+  <p:clrMapOvr>
+    <a:masterClrMapping/>
+  </p:clrMapOvr>
+</p:sld>
+</file>
+
+<file path=ppt/slides/slide7.xml><?xml version="1.0" encoding="utf-8"?>
+<p:sld xmlns:a="http://schemas.openxmlformats.org/drawingml/2006/main" xmlns:r="http://schemas.openxmlformats.org/officeDocument/2006/relationships" xmlns:mc="http://schemas.openxmlformats.org/markup-compatibility/2006" xmlns:mv="urn:schemas-microsoft-com:mac:vml" xmlns:p="http://schemas.openxmlformats.org/presentationml/2006/main" xmlns:c="http://schemas.openxmlformats.org/drawingml/2006/chart" xmlns:dgm="http://schemas.openxmlformats.org/drawingml/2006/diagram" xmlns:o="urn:schemas-microsoft-com:office:office" xmlns:v="urn:schemas-microsoft-com:vml" xmlns:pvml="urn:schemas-microsoft-com:office:powerpoint" xmlns:com="http://schemas.openxmlformats.org/drawingml/2006/compatibility" xmlns:p14="http://schemas.microsoft.com/office/powerpoint/2010/main" xmlns:p15="http://schemas.microsoft.com/office/powerpoint/2012/main" xmlns:ahyp="http://schemas.microsoft.com/office/drawing/2018/hyperlinkcolor">
+  <p:cSld>
+    <p:spTree>
+      <p:nvGrpSpPr>
+        <p:cNvPr id="366" name="Shape 366"/>
         <p:cNvGrpSpPr/>
         <p:nvPr/>
       </p:nvGrpSpPr>
@@ -21433,7 +22022,7 @@
       </p:grpSpPr>
       <p:sp>
         <p:nvSpPr>
-          <p:cNvPr id="357" name="Google Shape;357;p18"/>
+          <p:cNvPr id="367" name="Google Shape;367;p19"/>
           <p:cNvSpPr txBox="1"/>
           <p:nvPr>
             <p:ph type="title"/>
@@ -21473,7 +22062,7 @@
       </p:sp>
       <p:sp>
         <p:nvSpPr>
-          <p:cNvPr id="358" name="Google Shape;358;p18"/>
+          <p:cNvPr id="368" name="Google Shape;368;p19"/>
           <p:cNvSpPr txBox="1"/>
           <p:nvPr>
             <p:ph idx="1" type="body"/>
@@ -21481,8 +22070,8 @@
         </p:nvSpPr>
         <p:spPr>
           <a:xfrm>
-            <a:off x="1056750" y="1918875"/>
-            <a:ext cx="7030500" cy="2541600"/>
+            <a:off x="818700" y="1736350"/>
+            <a:ext cx="7268700" cy="3261000"/>
           </a:xfrm>
           <a:prstGeom prst="rect">
             <a:avLst/>
@@ -21493,6 +22082,23 @@
             <a:normAutofit/>
           </a:bodyPr>
           <a:lstStyle/>
+          <a:p>
+            <a:pPr indent="-311150" lvl="0" marL="457200" rtl="0" algn="l">
+              <a:spcBef>
+                <a:spcPts val="0"/>
+              </a:spcBef>
+              <a:spcAft>
+                <a:spcPts val="0"/>
+              </a:spcAft>
+              <a:buSzPts val="1300"/>
+              <a:buChar char="●"/>
+            </a:pPr>
+            <a:r>
+              <a:rPr lang="en"/>
+              <a:t>It is difficult to compute that a program is going to end up being infinite since the input variables that are provided to that function/program are only determined on execution.</a:t>
+            </a:r>
+            <a:endParaRPr/>
+          </a:p>
           <a:p>
             <a:pPr indent="-311150" lvl="0" marL="457200" rtl="0" algn="l">
               <a:spcBef>
@@ -21555,7 +22161,7 @@
             </a:pPr>
             <a:r>
               <a:rPr lang="en"/>
-              <a:t>This uncertainty in the program cannot be computed and can only be determined on the execution of the program which when done beats the case and results in an halting problem.</a:t>
+              <a:t>This uncertainty in the program cannot be computed and can only be determined on the execution of the program which when done beats the case and results in halting problem.</a:t>
             </a:r>
             <a:endParaRPr/>
           </a:p>
@@ -21572,9 +22178,61 @@
             </a:pPr>
             <a:r>
               <a:rPr lang="en"/>
-              <a:t>Hence, mathematically this inconsistency was derived and proved from various cases that the inconsistency is next to impossible to derive before executing the program leading into no feasible solution of the halting problem.</a:t>
+              <a:t>Hence, mathematically this inconsistency was derived and proved from various cases that the inconsistency is next to impossible to detect before executing the program leading into no feasible solution of the halting problem.</a:t>
             </a:r>
             <a:endParaRPr/>
+          </a:p>
+        </p:txBody>
+      </p:sp>
+      <p:sp>
+        <p:nvSpPr>
+          <p:cNvPr id="369" name="Google Shape;369;p19"/>
+          <p:cNvSpPr txBox="1"/>
+          <p:nvPr/>
+        </p:nvSpPr>
+        <p:spPr>
+          <a:xfrm>
+            <a:off x="21700" y="0"/>
+            <a:ext cx="1594800" cy="400200"/>
+          </a:xfrm>
+          <a:prstGeom prst="rect">
+            <a:avLst/>
+          </a:prstGeom>
+          <a:noFill/>
+          <a:ln>
+            <a:noFill/>
+          </a:ln>
+        </p:spPr>
+        <p:txBody>
+          <a:bodyPr anchorCtr="0" anchor="t" bIns="91425" lIns="91425" spcFirstLastPara="1" rIns="91425" wrap="square" tIns="91425">
+            <a:spAutoFit/>
+          </a:bodyPr>
+          <a:lstStyle/>
+          <a:p>
+            <a:pPr indent="0" lvl="0" marL="0" rtl="0" algn="l">
+              <a:spcBef>
+                <a:spcPts val="0"/>
+              </a:spcBef>
+              <a:spcAft>
+                <a:spcPts val="0"/>
+              </a:spcAft>
+              <a:buNone/>
+            </a:pPr>
+            <a:r>
+              <a:rPr lang="en">
+                <a:latin typeface="Nunito"/>
+                <a:ea typeface="Nunito"/>
+                <a:cs typeface="Nunito"/>
+                <a:sym typeface="Nunito"/>
+              </a:rPr>
+              <a:t>Kevin Joshi</a:t>
+            </a:r>
+            <a:endParaRPr>
+              <a:latin typeface="Nunito"/>
+              <a:ea typeface="Nunito"/>
+              <a:cs typeface="Nunito"/>
+              <a:sym typeface="Nunito"/>
+            </a:endParaRPr>
           </a:p>
         </p:txBody>
       </p:sp>
@@ -21586,12 +22244,12 @@
 </p:sld>
 </file>
 
-<file path=ppt/slides/slide7.xml><?xml version="1.0" encoding="utf-8"?>
+<file path=ppt/slides/slide8.xml><?xml version="1.0" encoding="utf-8"?>
 <p:sld xmlns:a="http://schemas.openxmlformats.org/drawingml/2006/main" xmlns:r="http://schemas.openxmlformats.org/officeDocument/2006/relationships" xmlns:mc="http://schemas.openxmlformats.org/markup-compatibility/2006" xmlns:mv="urn:schemas-microsoft-com:mac:vml" xmlns:p="http://schemas.openxmlformats.org/presentationml/2006/main" xmlns:c="http://schemas.openxmlformats.org/drawingml/2006/chart" xmlns:dgm="http://schemas.openxmlformats.org/drawingml/2006/diagram" xmlns:o="urn:schemas-microsoft-com:office:office" xmlns:v="urn:schemas-microsoft-com:vml" xmlns:pvml="urn:schemas-microsoft-com:office:powerpoint" xmlns:com="http://schemas.openxmlformats.org/drawingml/2006/compatibility" xmlns:p14="http://schemas.microsoft.com/office/powerpoint/2010/main" xmlns:p15="http://schemas.microsoft.com/office/powerpoint/2012/main" xmlns:ahyp="http://schemas.microsoft.com/office/drawing/2018/hyperlinkcolor">
   <p:cSld>
     <p:spTree>
       <p:nvGrpSpPr>
-        <p:cNvPr id="362" name="Shape 362"/>
+        <p:cNvPr id="373" name="Shape 373"/>
         <p:cNvGrpSpPr/>
         <p:nvPr/>
       </p:nvGrpSpPr>
@@ -21605,7 +22263,7 @@
       </p:grpSpPr>
       <p:sp>
         <p:nvSpPr>
-          <p:cNvPr id="363" name="Google Shape;363;p19"/>
+          <p:cNvPr id="374" name="Google Shape;374;p20"/>
           <p:cNvSpPr txBox="1"/>
           <p:nvPr>
             <p:ph type="title"/>
@@ -21645,7 +22303,7 @@
       </p:sp>
       <p:sp>
         <p:nvSpPr>
-          <p:cNvPr id="364" name="Google Shape;364;p19"/>
+          <p:cNvPr id="375" name="Google Shape;375;p20"/>
           <p:cNvSpPr txBox="1"/>
           <p:nvPr>
             <p:ph idx="1" type="body"/>
@@ -21653,8 +22311,8 @@
         </p:nvSpPr>
         <p:spPr>
           <a:xfrm>
-            <a:off x="1303800" y="1990050"/>
-            <a:ext cx="7030500" cy="2541600"/>
+            <a:off x="0" y="1980000"/>
+            <a:ext cx="6720600" cy="2541600"/>
           </a:xfrm>
           <a:prstGeom prst="rect">
             <a:avLst/>
@@ -21782,7 +22440,7 @@
                 <a:cs typeface="Arial"/>
                 <a:sym typeface="Arial"/>
               </a:rPr>
-              <a:t>A G¨odelization ϕ is a sequence of all partial recursive functions s.t. </a:t>
+              <a:t>A Godelization ϕ is a sequence of all partial recursive functions s.t. </a:t>
             </a:r>
             <a:endParaRPr>
               <a:solidFill>
@@ -21915,6 +22573,86 @@
           </a:p>
         </p:txBody>
       </p:sp>
+      <p:pic>
+        <p:nvPicPr>
+          <p:cNvPr descr="Halting Problem in Theory of Computation - GeeksforGeeks" id="376" name="Google Shape;376;p20"/>
+          <p:cNvPicPr preferRelativeResize="0"/>
+          <p:nvPr/>
+        </p:nvPicPr>
+        <p:blipFill>
+          <a:blip r:embed="rId3">
+            <a:alphaModFix/>
+          </a:blip>
+          <a:stretch>
+            <a:fillRect/>
+          </a:stretch>
+        </p:blipFill>
+        <p:spPr>
+          <a:xfrm>
+            <a:off x="6117950" y="2531550"/>
+            <a:ext cx="2686675" cy="1109875"/>
+          </a:xfrm>
+          <a:prstGeom prst="rect">
+            <a:avLst/>
+          </a:prstGeom>
+          <a:noFill/>
+          <a:ln>
+            <a:noFill/>
+          </a:ln>
+        </p:spPr>
+      </p:pic>
+      <p:sp>
+        <p:nvSpPr>
+          <p:cNvPr id="377" name="Google Shape;377;p20"/>
+          <p:cNvSpPr txBox="1"/>
+          <p:nvPr/>
+        </p:nvSpPr>
+        <p:spPr>
+          <a:xfrm>
+            <a:off x="21700" y="0"/>
+            <a:ext cx="1594800" cy="400200"/>
+          </a:xfrm>
+          <a:prstGeom prst="rect">
+            <a:avLst/>
+          </a:prstGeom>
+          <a:noFill/>
+          <a:ln>
+            <a:noFill/>
+          </a:ln>
+        </p:spPr>
+        <p:txBody>
+          <a:bodyPr anchorCtr="0" anchor="t" bIns="91425" lIns="91425" spcFirstLastPara="1" rIns="91425" wrap="square" tIns="91425">
+            <a:spAutoFit/>
+          </a:bodyPr>
+          <a:lstStyle/>
+          <a:p>
+            <a:pPr indent="0" lvl="0" marL="0" rtl="0" algn="l">
+              <a:spcBef>
+                <a:spcPts val="0"/>
+              </a:spcBef>
+              <a:spcAft>
+                <a:spcPts val="0"/>
+              </a:spcAft>
+              <a:buNone/>
+            </a:pPr>
+            <a:r>
+              <a:rPr lang="en">
+                <a:latin typeface="Nunito"/>
+                <a:ea typeface="Nunito"/>
+                <a:cs typeface="Nunito"/>
+                <a:sym typeface="Nunito"/>
+              </a:rPr>
+              <a:t>Devansh Shah</a:t>
+            </a:r>
+            <a:endParaRPr>
+              <a:latin typeface="Nunito"/>
+              <a:ea typeface="Nunito"/>
+              <a:cs typeface="Nunito"/>
+              <a:sym typeface="Nunito"/>
+            </a:endParaRPr>
+          </a:p>
+        </p:txBody>
+      </p:sp>
     </p:spTree>
   </p:cSld>
   <p:clrMapOvr>
@@ -21923,12 +22661,12 @@
 </p:sld>
 </file>
 
-<file path=ppt/slides/slide8.xml><?xml version="1.0" encoding="utf-8"?>
+<file path=ppt/slides/slide9.xml><?xml version="1.0" encoding="utf-8"?>
 <p:sld xmlns:a="http://schemas.openxmlformats.org/drawingml/2006/main" xmlns:r="http://schemas.openxmlformats.org/officeDocument/2006/relationships" xmlns:mc="http://schemas.openxmlformats.org/markup-compatibility/2006" xmlns:mv="urn:schemas-microsoft-com:mac:vml" xmlns:p="http://schemas.openxmlformats.org/presentationml/2006/main" xmlns:c="http://schemas.openxmlformats.org/drawingml/2006/chart" xmlns:dgm="http://schemas.openxmlformats.org/drawingml/2006/diagram" xmlns:o="urn:schemas-microsoft-com:office:office" xmlns:v="urn:schemas-microsoft-com:vml" xmlns:pvml="urn:schemas-microsoft-com:office:powerpoint" xmlns:com="http://schemas.openxmlformats.org/drawingml/2006/compatibility" xmlns:p14="http://schemas.microsoft.com/office/powerpoint/2010/main" xmlns:p15="http://schemas.microsoft.com/office/powerpoint/2012/main" xmlns:ahyp="http://schemas.microsoft.com/office/drawing/2018/hyperlinkcolor">
   <p:cSld>
     <p:spTree>
       <p:nvGrpSpPr>
-        <p:cNvPr id="368" name="Shape 368"/>
+        <p:cNvPr id="381" name="Shape 381"/>
         <p:cNvGrpSpPr/>
         <p:nvPr/>
       </p:nvGrpSpPr>
@@ -21942,7 +22680,7 @@
       </p:grpSpPr>
       <p:sp>
         <p:nvSpPr>
-          <p:cNvPr id="369" name="Google Shape;369;p20"/>
+          <p:cNvPr id="382" name="Google Shape;382;p21"/>
           <p:cNvSpPr txBox="1"/>
           <p:nvPr>
             <p:ph type="title"/>
@@ -21982,7 +22720,7 @@
       </p:sp>
       <p:sp>
         <p:nvSpPr>
-          <p:cNvPr id="370" name="Google Shape;370;p20"/>
+          <p:cNvPr id="383" name="Google Shape;383;p21"/>
           <p:cNvSpPr txBox="1"/>
           <p:nvPr>
             <p:ph idx="1" type="body"/>
@@ -21990,8 +22728,8 @@
         </p:nvSpPr>
         <p:spPr>
           <a:xfrm>
-            <a:off x="1303800" y="1990050"/>
-            <a:ext cx="7030500" cy="2541600"/>
+            <a:off x="0" y="1929775"/>
+            <a:ext cx="6590100" cy="2541600"/>
           </a:xfrm>
           <a:prstGeom prst="rect">
             <a:avLst/>
@@ -22188,51 +22926,56 @@
           </a:p>
         </p:txBody>
       </p:sp>
-    </p:spTree>
-  </p:cSld>
-  <p:clrMapOvr>
-    <a:masterClrMapping/>
-  </p:clrMapOvr>
-</p:sld>
-</file>
-
-<file path=ppt/slides/slide9.xml><?xml version="1.0" encoding="utf-8"?>
-<p:sld xmlns:a="http://schemas.openxmlformats.org/drawingml/2006/main" xmlns:r="http://schemas.openxmlformats.org/officeDocument/2006/relationships" xmlns:mc="http://schemas.openxmlformats.org/markup-compatibility/2006" xmlns:mv="urn:schemas-microsoft-com:mac:vml" xmlns:p="http://schemas.openxmlformats.org/presentationml/2006/main" xmlns:c="http://schemas.openxmlformats.org/drawingml/2006/chart" xmlns:dgm="http://schemas.openxmlformats.org/drawingml/2006/diagram" xmlns:o="urn:schemas-microsoft-com:office:office" xmlns:v="urn:schemas-microsoft-com:vml" xmlns:pvml="urn:schemas-microsoft-com:office:powerpoint" xmlns:com="http://schemas.openxmlformats.org/drawingml/2006/compatibility" xmlns:p14="http://schemas.microsoft.com/office/powerpoint/2010/main" xmlns:p15="http://schemas.microsoft.com/office/powerpoint/2012/main" xmlns:ahyp="http://schemas.microsoft.com/office/drawing/2018/hyperlinkcolor">
-  <p:cSld>
-    <p:spTree>
-      <p:nvGrpSpPr>
-        <p:cNvPr id="374" name="Shape 374"/>
-        <p:cNvGrpSpPr/>
-        <p:nvPr/>
-      </p:nvGrpSpPr>
-      <p:grpSpPr>
-        <a:xfrm>
-          <a:off x="0" y="0"/>
-          <a:ext cx="0" cy="0"/>
-          <a:chOff x="0" y="0"/>
-          <a:chExt cx="0" cy="0"/>
-        </a:xfrm>
-      </p:grpSpPr>
-      <p:sp>
-        <p:nvSpPr>
-          <p:cNvPr id="375" name="Google Shape;375;p21"/>
-          <p:cNvSpPr txBox="1"/>
-          <p:nvPr>
-            <p:ph type="title"/>
-          </p:nvPr>
-        </p:nvSpPr>
+      <p:pic>
+        <p:nvPicPr>
+          <p:cNvPr descr="NP-Completeness | Set 1 (Introduction) - GeeksforGeeks" id="384" name="Google Shape;384;p21"/>
+          <p:cNvPicPr preferRelativeResize="0"/>
+          <p:nvPr/>
+        </p:nvPicPr>
+        <p:blipFill>
+          <a:blip r:embed="rId3">
+            <a:alphaModFix/>
+          </a:blip>
+          <a:stretch>
+            <a:fillRect/>
+          </a:stretch>
+        </p:blipFill>
         <p:spPr>
           <a:xfrm>
-            <a:off x="1303800" y="598575"/>
-            <a:ext cx="7030500" cy="999300"/>
+            <a:off x="6359050" y="2508975"/>
+            <a:ext cx="2784950" cy="1767750"/>
           </a:xfrm>
           <a:prstGeom prst="rect">
             <a:avLst/>
           </a:prstGeom>
+          <a:noFill/>
+          <a:ln>
+            <a:noFill/>
+          </a:ln>
+        </p:spPr>
+      </p:pic>
+      <p:sp>
+        <p:nvSpPr>
+          <p:cNvPr id="385" name="Google Shape;385;p21"/>
+          <p:cNvSpPr txBox="1"/>
+          <p:nvPr/>
+        </p:nvSpPr>
+        <p:spPr>
+          <a:xfrm>
+            <a:off x="21700" y="0"/>
+            <a:ext cx="1594800" cy="400200"/>
+          </a:xfrm>
+          <a:prstGeom prst="rect">
+            <a:avLst/>
+          </a:prstGeom>
+          <a:noFill/>
+          <a:ln>
+            <a:noFill/>
+          </a:ln>
         </p:spPr>
         <p:txBody>
           <a:bodyPr anchorCtr="0" anchor="t" bIns="91425" lIns="91425" spcFirstLastPara="1" rIns="91425" wrap="square" tIns="91425">
-            <a:normAutofit/>
+            <a:spAutoFit/>
           </a:bodyPr>
           <a:lstStyle/>
           <a:p>
@@ -22246,121 +22989,20 @@
               <a:buNone/>
             </a:pPr>
             <a:r>
-              <a:rPr lang="en" sz="4200"/>
-              <a:t>Conclusion</a:t>
+              <a:rPr lang="en">
+                <a:latin typeface="Nunito"/>
+                <a:ea typeface="Nunito"/>
+                <a:cs typeface="Nunito"/>
+                <a:sym typeface="Nunito"/>
+              </a:rPr>
+              <a:t>Devansh Shah</a:t>
             </a:r>
-            <a:endParaRPr sz="4200"/>
-          </a:p>
-        </p:txBody>
-      </p:sp>
-      <p:sp>
-        <p:nvSpPr>
-          <p:cNvPr id="376" name="Google Shape;376;p21"/>
-          <p:cNvSpPr txBox="1"/>
-          <p:nvPr>
-            <p:ph idx="1" type="body"/>
-          </p:nvPr>
-        </p:nvSpPr>
-        <p:spPr>
-          <a:xfrm>
-            <a:off x="1303800" y="1946675"/>
-            <a:ext cx="7030500" cy="2541600"/>
-          </a:xfrm>
-          <a:prstGeom prst="rect">
-            <a:avLst/>
-          </a:prstGeom>
-        </p:spPr>
-        <p:txBody>
-          <a:bodyPr anchorCtr="0" anchor="t" bIns="91425" lIns="91425" spcFirstLastPara="1" rIns="91425" wrap="square" tIns="91425">
-            <a:normAutofit/>
-          </a:bodyPr>
-          <a:lstStyle/>
-          <a:p>
-            <a:pPr indent="0" lvl="0" marL="0" rtl="0" algn="l">
-              <a:spcBef>
-                <a:spcPts val="0"/>
-              </a:spcBef>
-              <a:spcAft>
-                <a:spcPts val="0"/>
-              </a:spcAft>
-              <a:buNone/>
-            </a:pPr>
-            <a:r>
-              <a:rPr lang="en"/>
-              <a:t>From the three research papers, we can conclude that we learnt about the halting problem in a flow. </a:t>
-            </a:r>
-            <a:endParaRPr/>
-          </a:p>
-          <a:p>
-            <a:pPr indent="-311150" lvl="0" marL="457200" rtl="0" algn="l">
-              <a:spcBef>
-                <a:spcPts val="1200"/>
-              </a:spcBef>
-              <a:spcAft>
-                <a:spcPts val="0"/>
-              </a:spcAft>
-              <a:buSzPts val="1300"/>
-              <a:buChar char="●"/>
-            </a:pPr>
-            <a:r>
-              <a:rPr lang="en"/>
-              <a:t>Firstly, we saw the history of halting problem and how the credit should go to Martin Davis for defining the halting problem.</a:t>
-            </a:r>
-            <a:endParaRPr/>
-          </a:p>
-          <a:p>
-            <a:pPr indent="-311150" lvl="0" marL="457200" rtl="0" algn="l">
-              <a:spcBef>
-                <a:spcPts val="0"/>
-              </a:spcBef>
-              <a:spcAft>
-                <a:spcPts val="0"/>
-              </a:spcAft>
-              <a:buSzPts val="1300"/>
-              <a:buChar char="●"/>
-            </a:pPr>
-            <a:r>
-              <a:rPr lang="en"/>
-              <a:t>Furthermore</a:t>
-            </a:r>
-            <a:r>
-              <a:rPr lang="en"/>
-              <a:t>, we studied about the problems faced in the halting problem that lead to the unsolvability and or </a:t>
-            </a:r>
-            <a:r>
-              <a:rPr lang="en"/>
-              <a:t>inconsistency</a:t>
-            </a:r>
-            <a:r>
-              <a:rPr lang="en"/>
-              <a:t> of the halting problem.</a:t>
-            </a:r>
-            <a:endParaRPr/>
-          </a:p>
-          <a:p>
-            <a:pPr indent="-311150" lvl="0" marL="457200" rtl="0" algn="l">
-              <a:spcBef>
-                <a:spcPts val="0"/>
-              </a:spcBef>
-              <a:spcAft>
-                <a:spcPts val="0"/>
-              </a:spcAft>
-              <a:buSzPts val="1300"/>
-              <a:buChar char="●"/>
-            </a:pPr>
-            <a:r>
-              <a:rPr lang="en"/>
-              <a:t>Finally, we learnt about the way to solve the problem just to realize that there is no </a:t>
-            </a:r>
-            <a:r>
-              <a:rPr lang="en"/>
-              <a:t>algorithm</a:t>
-            </a:r>
-            <a:r>
-              <a:rPr lang="en"/>
-              <a:t> that gives the exact solution. Hence, we studied different propositions and definitions to sharpen the approximations to the halting problem.</a:t>
-            </a:r>
-            <a:endParaRPr/>
+            <a:endParaRPr>
+              <a:latin typeface="Nunito"/>
+              <a:ea typeface="Nunito"/>
+              <a:cs typeface="Nunito"/>
+              <a:sym typeface="Nunito"/>
+            </a:endParaRPr>
           </a:p>
         </p:txBody>
       </p:sp>

</xml_diff>